<commit_message>
adding actuators and related changes
</commit_message>
<xml_diff>
--- a/ppt/Spring boot actuator.pptx
+++ b/ppt/Spring boot actuator.pptx
@@ -10,12 +10,11 @@
     <p:sldId id="257" r:id="rId4"/>
     <p:sldId id="258" r:id="rId5"/>
     <p:sldId id="259" r:id="rId6"/>
-    <p:sldId id="260" r:id="rId7"/>
-    <p:sldId id="261" r:id="rId8"/>
-    <p:sldId id="262" r:id="rId9"/>
-    <p:sldId id="263" r:id="rId10"/>
-    <p:sldId id="265" r:id="rId11"/>
-    <p:sldId id="264" r:id="rId12"/>
+    <p:sldId id="261" r:id="rId7"/>
+    <p:sldId id="263" r:id="rId8"/>
+    <p:sldId id="265" r:id="rId9"/>
+    <p:sldId id="260" r:id="rId10"/>
+    <p:sldId id="264" r:id="rId11"/>
   </p:sldIdLst>
   <p:sldSz cx="12192000" cy="6858000"/>
   <p:notesSz cx="6858000" cy="9144000"/>
@@ -114,6 +113,11 @@
       </a:defRPr>
     </a:lvl9pPr>
   </p:defaultTextStyle>
+  <p:extLst>
+    <p:ext uri="{EFAFB233-063F-42B5-8137-9DF3F51BA10A}">
+      <p15:sldGuideLst xmlns:p15="http://schemas.microsoft.com/office/powerpoint/2012/main"/>
+    </p:ext>
+  </p:extLst>
 </p:presentation>
 </file>
 
@@ -361,7 +365,7 @@
           <a:p>
             <a:fld id="{9184DA70-C731-4C70-880D-CCD4705E623C}" type="datetime1">
               <a:rPr lang="en-US" smtClean="0"/>
-              <a:t>7/18/2019</a:t>
+              <a:t>7/20/2019</a:t>
             </a:fld>
             <a:endParaRPr lang="en-US" dirty="0"/>
           </a:p>
@@ -549,7 +553,7 @@
           <a:p>
             <a:fld id="{B612A279-0833-481D-8C56-F67FD0AC6C50}" type="datetime1">
               <a:rPr lang="en-US" smtClean="0"/>
-              <a:t>7/18/2019</a:t>
+              <a:t>7/20/2019</a:t>
             </a:fld>
             <a:endParaRPr lang="en-US" dirty="0"/>
           </a:p>
@@ -791,7 +795,7 @@
           <a:p>
             <a:fld id="{6587DA83-5663-4C9C-B9AA-0B40A3DAFF81}" type="datetime1">
               <a:rPr lang="en-US" smtClean="0"/>
-              <a:t>7/18/2019</a:t>
+              <a:t>7/20/2019</a:t>
             </a:fld>
             <a:endParaRPr lang="en-US" dirty="0"/>
           </a:p>
@@ -979,7 +983,7 @@
           <a:p>
             <a:fld id="{4BE1D723-8F53-4F53-90B0-1982A396982E}" type="datetime1">
               <a:rPr lang="en-US" smtClean="0"/>
-              <a:t>7/18/2019</a:t>
+              <a:t>7/20/2019</a:t>
             </a:fld>
             <a:endParaRPr lang="en-US" dirty="0"/>
           </a:p>
@@ -1352,7 +1356,7 @@
           <a:p>
             <a:fld id="{97669AF7-7BEB-44E4-9852-375E34362B5B}" type="datetime1">
               <a:rPr lang="en-US" smtClean="0"/>
-              <a:t>7/18/2019</a:t>
+              <a:t>7/20/2019</a:t>
             </a:fld>
             <a:endParaRPr lang="en-US" dirty="0"/>
           </a:p>
@@ -1607,7 +1611,7 @@
           <a:p>
             <a:fld id="{BAAAC38D-0552-4C82-B593-E6124DFADBE2}" type="datetime1">
               <a:rPr lang="en-US" smtClean="0"/>
-              <a:t>7/18/2019</a:t>
+              <a:t>7/20/2019</a:t>
             </a:fld>
             <a:endParaRPr lang="en-US" dirty="0"/>
           </a:p>
@@ -2004,7 +2008,7 @@
           <a:p>
             <a:fld id="{D9DF0F1C-5577-4ACB-BB62-DF8F3C494C7E}" type="datetime1">
               <a:rPr lang="en-US" smtClean="0"/>
-              <a:t>7/18/2019</a:t>
+              <a:t>7/20/2019</a:t>
             </a:fld>
             <a:endParaRPr lang="en-US" dirty="0"/>
           </a:p>
@@ -2140,7 +2144,7 @@
           <a:p>
             <a:fld id="{1775B394-D9F9-4F0C-B15D-605F45CB9E9F}" type="datetime1">
               <a:rPr lang="en-US" smtClean="0"/>
-              <a:t>7/18/2019</a:t>
+              <a:t>7/20/2019</a:t>
             </a:fld>
             <a:endParaRPr lang="en-US" dirty="0"/>
           </a:p>
@@ -2297,7 +2301,7 @@
           <a:p>
             <a:fld id="{39667345-2558-425A-8533-9BFDBCE15005}" type="datetime1">
               <a:rPr lang="en-US" smtClean="0"/>
-              <a:t>7/18/2019</a:t>
+              <a:t>7/20/2019</a:t>
             </a:fld>
             <a:endParaRPr lang="en-US" dirty="0"/>
           </a:p>
@@ -2626,7 +2630,7 @@
           <a:p>
             <a:fld id="{92BEA474-078D-4E9B-9B14-09A87B19DC46}" type="datetime1">
               <a:rPr lang="en-US" smtClean="0"/>
-              <a:t>7/18/2019</a:t>
+              <a:t>7/20/2019</a:t>
             </a:fld>
             <a:endParaRPr lang="en-US" dirty="0"/>
           </a:p>
@@ -2976,7 +2980,7 @@
           <a:p>
             <a:fld id="{4907D986-8816-4272-A432-0437A28A9828}" type="datetime1">
               <a:rPr lang="en-US" smtClean="0"/>
-              <a:t>7/18/2019</a:t>
+              <a:t>7/20/2019</a:t>
             </a:fld>
             <a:endParaRPr lang="en-US" dirty="0"/>
           </a:p>
@@ -3237,7 +3241,7 @@
           <a:p>
             <a:fld id="{62D6E202-B606-4609-B914-27C9371A1F6D}" type="datetime1">
               <a:rPr lang="en-US" smtClean="0"/>
-              <a:t>7/18/2019</a:t>
+              <a:t>7/20/2019</a:t>
             </a:fld>
             <a:endParaRPr lang="en-US" dirty="0"/>
           </a:p>
@@ -3896,10 +3900,6 @@
               </a:prstClr>
             </a:innerShdw>
           </a:effectLst>
-          <a:scene3d>
-            <a:camera prst="perspectiveRelaxedModerately"/>
-            <a:lightRig rig="threePt" dir="t"/>
-          </a:scene3d>
         </p:spPr>
         <p:txBody>
           <a:bodyPr>
@@ -3940,12 +3940,33 @@
         </p:nvSpPr>
         <p:spPr>
           <a:xfrm>
-            <a:off x="1100051" y="4645152"/>
-            <a:ext cx="10058400" cy="1143000"/>
+            <a:off x="3952874" y="4624372"/>
+            <a:ext cx="4605251" cy="854201"/>
           </a:xfrm>
-          <a:solidFill>
-            <a:srgbClr val="92D050"/>
-          </a:solidFill>
+          <a:gradFill flip="none" rotWithShape="1">
+            <a:gsLst>
+              <a:gs pos="0">
+                <a:srgbClr val="92D050">
+                  <a:tint val="66000"/>
+                  <a:satMod val="160000"/>
+                </a:srgbClr>
+              </a:gs>
+              <a:gs pos="50000">
+                <a:srgbClr val="92D050">
+                  <a:tint val="44500"/>
+                  <a:satMod val="160000"/>
+                </a:srgbClr>
+              </a:gs>
+              <a:gs pos="100000">
+                <a:srgbClr val="92D050">
+                  <a:tint val="23500"/>
+                  <a:satMod val="160000"/>
+                </a:srgbClr>
+              </a:gs>
+            </a:gsLst>
+            <a:lin ang="0" scaled="1"/>
+            <a:tileRect/>
+          </a:gradFill>
           <a:ln>
             <a:noFill/>
           </a:ln>
@@ -3976,20 +3997,24 @@
         </p:spPr>
         <p:txBody>
           <a:bodyPr>
-            <a:normAutofit/>
+            <a:normAutofit fontScale="92500" lnSpcReduction="20000"/>
           </a:bodyPr>
           <a:lstStyle/>
           <a:p>
             <a:endParaRPr lang="en-IN" dirty="0">
               <a:solidFill>
-                <a:srgbClr val="FFFFFF"/>
+                <a:srgbClr val="00B050"/>
               </a:solidFill>
             </a:endParaRPr>
           </a:p>
           <a:p>
             <a:pPr algn="ctr"/>
             <a:r>
-              <a:rPr lang="en-IN" dirty="0"/>
+              <a:rPr lang="en-IN" dirty="0">
+                <a:solidFill>
+                  <a:srgbClr val="00B050"/>
+                </a:solidFill>
+              </a:rPr>
               <a:t>- #GREENLEARNER --</a:t>
             </a:r>
           </a:p>
@@ -4139,115 +4164,6 @@
           <p:cNvPr id="2" name="Title 1">
             <a:extLst>
               <a:ext uri="{FF2B5EF4-FFF2-40B4-BE49-F238E27FC236}">
-                <a16:creationId xmlns:a16="http://schemas.microsoft.com/office/drawing/2014/main" id="{BBCBEA67-0487-4841-9DF8-1087E32FD817}"/>
-              </a:ext>
-            </a:extLst>
-          </p:cNvPr>
-          <p:cNvSpPr>
-            <a:spLocks noGrp="1"/>
-          </p:cNvSpPr>
-          <p:nvPr>
-            <p:ph type="title"/>
-          </p:nvPr>
-        </p:nvSpPr>
-        <p:spPr>
-          <a:solidFill>
-            <a:srgbClr val="92D050"/>
-          </a:solidFill>
-          <a:ln>
-            <a:noFill/>
-          </a:ln>
-          <a:effectLst>
-            <a:outerShdw blurRad="149987" dist="250190" dir="8460000" algn="ctr">
-              <a:srgbClr val="000000">
-                <a:alpha val="28000"/>
-              </a:srgbClr>
-            </a:outerShdw>
-          </a:effectLst>
-          <a:scene3d>
-            <a:camera prst="orthographicFront">
-              <a:rot lat="0" lon="0" rev="0"/>
-            </a:camera>
-            <a:lightRig rig="contrasting" dir="t">
-              <a:rot lat="0" lon="0" rev="1500000"/>
-            </a:lightRig>
-          </a:scene3d>
-          <a:sp3d prstMaterial="metal">
-            <a:bevelT w="88900" h="88900"/>
-          </a:sp3d>
-        </p:spPr>
-        <p:txBody>
-          <a:bodyPr/>
-          <a:lstStyle/>
-          <a:p>
-            <a:r>
-              <a:rPr lang="en-IN" b="1" dirty="0"/>
-              <a:t>Writing custom health indicators	</a:t>
-            </a:r>
-            <a:endParaRPr lang="en-IN" dirty="0"/>
-          </a:p>
-        </p:txBody>
-      </p:sp>
-      <p:sp>
-        <p:nvSpPr>
-          <p:cNvPr id="3" name="Content Placeholder 2">
-            <a:extLst>
-              <a:ext uri="{FF2B5EF4-FFF2-40B4-BE49-F238E27FC236}">
-                <a16:creationId xmlns:a16="http://schemas.microsoft.com/office/drawing/2014/main" id="{3F44392C-7362-4AC3-921F-137FB77127DB}"/>
-              </a:ext>
-            </a:extLst>
-          </p:cNvPr>
-          <p:cNvSpPr>
-            <a:spLocks noGrp="1"/>
-          </p:cNvSpPr>
-          <p:nvPr>
-            <p:ph idx="1"/>
-          </p:nvPr>
-        </p:nvSpPr>
-        <p:spPr/>
-        <p:txBody>
-          <a:bodyPr/>
-          <a:lstStyle/>
-          <a:p>
-            <a:endParaRPr lang="en-IN"/>
-          </a:p>
-        </p:txBody>
-      </p:sp>
-    </p:spTree>
-    <p:extLst>
-      <p:ext uri="{BB962C8B-B14F-4D97-AF65-F5344CB8AC3E}">
-        <p14:creationId xmlns:p14="http://schemas.microsoft.com/office/powerpoint/2010/main" val="4130093711"/>
-      </p:ext>
-    </p:extLst>
-  </p:cSld>
-  <p:clrMapOvr>
-    <a:masterClrMapping/>
-  </p:clrMapOvr>
-</p:sld>
-</file>
-
-<file path=ppt/slides/slide11.xml><?xml version="1.0" encoding="utf-8"?>
-<p:sld xmlns:a="http://schemas.openxmlformats.org/drawingml/2006/main" xmlns:r="http://schemas.openxmlformats.org/officeDocument/2006/relationships" xmlns:p="http://schemas.openxmlformats.org/presentationml/2006/main">
-  <p:cSld>
-    <p:spTree>
-      <p:nvGrpSpPr>
-        <p:cNvPr id="1" name=""/>
-        <p:cNvGrpSpPr/>
-        <p:nvPr/>
-      </p:nvGrpSpPr>
-      <p:grpSpPr>
-        <a:xfrm>
-          <a:off x="0" y="0"/>
-          <a:ext cx="0" cy="0"/>
-          <a:chOff x="0" y="0"/>
-          <a:chExt cx="0" cy="0"/>
-        </a:xfrm>
-      </p:grpSpPr>
-      <p:sp>
-        <p:nvSpPr>
-          <p:cNvPr id="2" name="Title 1">
-            <a:extLst>
-              <a:ext uri="{FF2B5EF4-FFF2-40B4-BE49-F238E27FC236}">
                 <a16:creationId xmlns:a16="http://schemas.microsoft.com/office/drawing/2014/main" id="{DAFACA3E-550E-41D1-86AA-051CCB4AAC9A}"/>
               </a:ext>
             </a:extLst>
@@ -4456,6 +4372,16 @@
               <a:t>Custom indicators</a:t>
             </a:r>
           </a:p>
+          <a:p>
+            <a:pPr>
+              <a:buFont typeface="Wingdings" panose="05000000000000000000" pitchFamily="2" charset="2"/>
+              <a:buChar char="Ø"/>
+            </a:pPr>
+            <a:r>
+              <a:rPr lang="en-IN" dirty="0"/>
+              <a:t>Securing endpoints</a:t>
+            </a:r>
+          </a:p>
         </p:txBody>
       </p:sp>
     </p:spTree>
@@ -4468,6 +4394,844 @@
   <p:clrMapOvr>
     <a:masterClrMapping/>
   </p:clrMapOvr>
+  <p:timing>
+    <p:tnLst>
+      <p:par>
+        <p:cTn id="1" dur="indefinite" restart="never" nodeType="tmRoot">
+          <p:childTnLst>
+            <p:seq concurrent="1" nextAc="seek">
+              <p:cTn id="2" dur="indefinite" nodeType="mainSeq">
+                <p:childTnLst>
+                  <p:par>
+                    <p:cTn id="3" fill="hold">
+                      <p:stCondLst>
+                        <p:cond delay="indefinite"/>
+                      </p:stCondLst>
+                      <p:childTnLst>
+                        <p:par>
+                          <p:cTn id="4" fill="hold">
+                            <p:stCondLst>
+                              <p:cond delay="0"/>
+                            </p:stCondLst>
+                            <p:childTnLst>
+                              <p:par>
+                                <p:cTn id="5" presetID="42" presetClass="entr" presetSubtype="0" fill="hold" grpId="0" nodeType="clickEffect">
+                                  <p:stCondLst>
+                                    <p:cond delay="0"/>
+                                  </p:stCondLst>
+                                  <p:childTnLst>
+                                    <p:set>
+                                      <p:cBhvr>
+                                        <p:cTn id="6" dur="1" fill="hold">
+                                          <p:stCondLst>
+                                            <p:cond delay="0"/>
+                                          </p:stCondLst>
+                                        </p:cTn>
+                                        <p:tgtEl>
+                                          <p:spTgt spid="3">
+                                            <p:txEl>
+                                              <p:pRg st="0" end="0"/>
+                                            </p:txEl>
+                                          </p:spTgt>
+                                        </p:tgtEl>
+                                        <p:attrNameLst>
+                                          <p:attrName>style.visibility</p:attrName>
+                                        </p:attrNameLst>
+                                      </p:cBhvr>
+                                      <p:to>
+                                        <p:strVal val="visible"/>
+                                      </p:to>
+                                    </p:set>
+                                    <p:animEffect transition="in" filter="fade">
+                                      <p:cBhvr>
+                                        <p:cTn id="7" dur="1000"/>
+                                        <p:tgtEl>
+                                          <p:spTgt spid="3">
+                                            <p:txEl>
+                                              <p:pRg st="0" end="0"/>
+                                            </p:txEl>
+                                          </p:spTgt>
+                                        </p:tgtEl>
+                                      </p:cBhvr>
+                                    </p:animEffect>
+                                    <p:anim calcmode="lin" valueType="num">
+                                      <p:cBhvr>
+                                        <p:cTn id="8" dur="1000" fill="hold"/>
+                                        <p:tgtEl>
+                                          <p:spTgt spid="3">
+                                            <p:txEl>
+                                              <p:pRg st="0" end="0"/>
+                                            </p:txEl>
+                                          </p:spTgt>
+                                        </p:tgtEl>
+                                        <p:attrNameLst>
+                                          <p:attrName>ppt_x</p:attrName>
+                                        </p:attrNameLst>
+                                      </p:cBhvr>
+                                      <p:tavLst>
+                                        <p:tav tm="0">
+                                          <p:val>
+                                            <p:strVal val="#ppt_x"/>
+                                          </p:val>
+                                        </p:tav>
+                                        <p:tav tm="100000">
+                                          <p:val>
+                                            <p:strVal val="#ppt_x"/>
+                                          </p:val>
+                                        </p:tav>
+                                      </p:tavLst>
+                                    </p:anim>
+                                    <p:anim calcmode="lin" valueType="num">
+                                      <p:cBhvr>
+                                        <p:cTn id="9" dur="1000" fill="hold"/>
+                                        <p:tgtEl>
+                                          <p:spTgt spid="3">
+                                            <p:txEl>
+                                              <p:pRg st="0" end="0"/>
+                                            </p:txEl>
+                                          </p:spTgt>
+                                        </p:tgtEl>
+                                        <p:attrNameLst>
+                                          <p:attrName>ppt_y</p:attrName>
+                                        </p:attrNameLst>
+                                      </p:cBhvr>
+                                      <p:tavLst>
+                                        <p:tav tm="0">
+                                          <p:val>
+                                            <p:strVal val="#ppt_y+.1"/>
+                                          </p:val>
+                                        </p:tav>
+                                        <p:tav tm="100000">
+                                          <p:val>
+                                            <p:strVal val="#ppt_y"/>
+                                          </p:val>
+                                        </p:tav>
+                                      </p:tavLst>
+                                    </p:anim>
+                                  </p:childTnLst>
+                                </p:cTn>
+                              </p:par>
+                            </p:childTnLst>
+                          </p:cTn>
+                        </p:par>
+                      </p:childTnLst>
+                    </p:cTn>
+                  </p:par>
+                  <p:par>
+                    <p:cTn id="10" fill="hold">
+                      <p:stCondLst>
+                        <p:cond delay="indefinite"/>
+                      </p:stCondLst>
+                      <p:childTnLst>
+                        <p:par>
+                          <p:cTn id="11" fill="hold">
+                            <p:stCondLst>
+                              <p:cond delay="0"/>
+                            </p:stCondLst>
+                            <p:childTnLst>
+                              <p:par>
+                                <p:cTn id="12" presetID="42" presetClass="entr" presetSubtype="0" fill="hold" grpId="0" nodeType="clickEffect">
+                                  <p:stCondLst>
+                                    <p:cond delay="0"/>
+                                  </p:stCondLst>
+                                  <p:childTnLst>
+                                    <p:set>
+                                      <p:cBhvr>
+                                        <p:cTn id="13" dur="1" fill="hold">
+                                          <p:stCondLst>
+                                            <p:cond delay="0"/>
+                                          </p:stCondLst>
+                                        </p:cTn>
+                                        <p:tgtEl>
+                                          <p:spTgt spid="3">
+                                            <p:txEl>
+                                              <p:pRg st="1" end="1"/>
+                                            </p:txEl>
+                                          </p:spTgt>
+                                        </p:tgtEl>
+                                        <p:attrNameLst>
+                                          <p:attrName>style.visibility</p:attrName>
+                                        </p:attrNameLst>
+                                      </p:cBhvr>
+                                      <p:to>
+                                        <p:strVal val="visible"/>
+                                      </p:to>
+                                    </p:set>
+                                    <p:animEffect transition="in" filter="fade">
+                                      <p:cBhvr>
+                                        <p:cTn id="14" dur="1000"/>
+                                        <p:tgtEl>
+                                          <p:spTgt spid="3">
+                                            <p:txEl>
+                                              <p:pRg st="1" end="1"/>
+                                            </p:txEl>
+                                          </p:spTgt>
+                                        </p:tgtEl>
+                                      </p:cBhvr>
+                                    </p:animEffect>
+                                    <p:anim calcmode="lin" valueType="num">
+                                      <p:cBhvr>
+                                        <p:cTn id="15" dur="1000" fill="hold"/>
+                                        <p:tgtEl>
+                                          <p:spTgt spid="3">
+                                            <p:txEl>
+                                              <p:pRg st="1" end="1"/>
+                                            </p:txEl>
+                                          </p:spTgt>
+                                        </p:tgtEl>
+                                        <p:attrNameLst>
+                                          <p:attrName>ppt_x</p:attrName>
+                                        </p:attrNameLst>
+                                      </p:cBhvr>
+                                      <p:tavLst>
+                                        <p:tav tm="0">
+                                          <p:val>
+                                            <p:strVal val="#ppt_x"/>
+                                          </p:val>
+                                        </p:tav>
+                                        <p:tav tm="100000">
+                                          <p:val>
+                                            <p:strVal val="#ppt_x"/>
+                                          </p:val>
+                                        </p:tav>
+                                      </p:tavLst>
+                                    </p:anim>
+                                    <p:anim calcmode="lin" valueType="num">
+                                      <p:cBhvr>
+                                        <p:cTn id="16" dur="1000" fill="hold"/>
+                                        <p:tgtEl>
+                                          <p:spTgt spid="3">
+                                            <p:txEl>
+                                              <p:pRg st="1" end="1"/>
+                                            </p:txEl>
+                                          </p:spTgt>
+                                        </p:tgtEl>
+                                        <p:attrNameLst>
+                                          <p:attrName>ppt_y</p:attrName>
+                                        </p:attrNameLst>
+                                      </p:cBhvr>
+                                      <p:tavLst>
+                                        <p:tav tm="0">
+                                          <p:val>
+                                            <p:strVal val="#ppt_y+.1"/>
+                                          </p:val>
+                                        </p:tav>
+                                        <p:tav tm="100000">
+                                          <p:val>
+                                            <p:strVal val="#ppt_y"/>
+                                          </p:val>
+                                        </p:tav>
+                                      </p:tavLst>
+                                    </p:anim>
+                                  </p:childTnLst>
+                                </p:cTn>
+                              </p:par>
+                            </p:childTnLst>
+                          </p:cTn>
+                        </p:par>
+                      </p:childTnLst>
+                    </p:cTn>
+                  </p:par>
+                  <p:par>
+                    <p:cTn id="17" fill="hold">
+                      <p:stCondLst>
+                        <p:cond delay="indefinite"/>
+                      </p:stCondLst>
+                      <p:childTnLst>
+                        <p:par>
+                          <p:cTn id="18" fill="hold">
+                            <p:stCondLst>
+                              <p:cond delay="0"/>
+                            </p:stCondLst>
+                            <p:childTnLst>
+                              <p:par>
+                                <p:cTn id="19" presetID="42" presetClass="entr" presetSubtype="0" fill="hold" grpId="0" nodeType="clickEffect">
+                                  <p:stCondLst>
+                                    <p:cond delay="0"/>
+                                  </p:stCondLst>
+                                  <p:childTnLst>
+                                    <p:set>
+                                      <p:cBhvr>
+                                        <p:cTn id="20" dur="1" fill="hold">
+                                          <p:stCondLst>
+                                            <p:cond delay="0"/>
+                                          </p:stCondLst>
+                                        </p:cTn>
+                                        <p:tgtEl>
+                                          <p:spTgt spid="3">
+                                            <p:txEl>
+                                              <p:pRg st="2" end="2"/>
+                                            </p:txEl>
+                                          </p:spTgt>
+                                        </p:tgtEl>
+                                        <p:attrNameLst>
+                                          <p:attrName>style.visibility</p:attrName>
+                                        </p:attrNameLst>
+                                      </p:cBhvr>
+                                      <p:to>
+                                        <p:strVal val="visible"/>
+                                      </p:to>
+                                    </p:set>
+                                    <p:animEffect transition="in" filter="fade">
+                                      <p:cBhvr>
+                                        <p:cTn id="21" dur="1000"/>
+                                        <p:tgtEl>
+                                          <p:spTgt spid="3">
+                                            <p:txEl>
+                                              <p:pRg st="2" end="2"/>
+                                            </p:txEl>
+                                          </p:spTgt>
+                                        </p:tgtEl>
+                                      </p:cBhvr>
+                                    </p:animEffect>
+                                    <p:anim calcmode="lin" valueType="num">
+                                      <p:cBhvr>
+                                        <p:cTn id="22" dur="1000" fill="hold"/>
+                                        <p:tgtEl>
+                                          <p:spTgt spid="3">
+                                            <p:txEl>
+                                              <p:pRg st="2" end="2"/>
+                                            </p:txEl>
+                                          </p:spTgt>
+                                        </p:tgtEl>
+                                        <p:attrNameLst>
+                                          <p:attrName>ppt_x</p:attrName>
+                                        </p:attrNameLst>
+                                      </p:cBhvr>
+                                      <p:tavLst>
+                                        <p:tav tm="0">
+                                          <p:val>
+                                            <p:strVal val="#ppt_x"/>
+                                          </p:val>
+                                        </p:tav>
+                                        <p:tav tm="100000">
+                                          <p:val>
+                                            <p:strVal val="#ppt_x"/>
+                                          </p:val>
+                                        </p:tav>
+                                      </p:tavLst>
+                                    </p:anim>
+                                    <p:anim calcmode="lin" valueType="num">
+                                      <p:cBhvr>
+                                        <p:cTn id="23" dur="1000" fill="hold"/>
+                                        <p:tgtEl>
+                                          <p:spTgt spid="3">
+                                            <p:txEl>
+                                              <p:pRg st="2" end="2"/>
+                                            </p:txEl>
+                                          </p:spTgt>
+                                        </p:tgtEl>
+                                        <p:attrNameLst>
+                                          <p:attrName>ppt_y</p:attrName>
+                                        </p:attrNameLst>
+                                      </p:cBhvr>
+                                      <p:tavLst>
+                                        <p:tav tm="0">
+                                          <p:val>
+                                            <p:strVal val="#ppt_y+.1"/>
+                                          </p:val>
+                                        </p:tav>
+                                        <p:tav tm="100000">
+                                          <p:val>
+                                            <p:strVal val="#ppt_y"/>
+                                          </p:val>
+                                        </p:tav>
+                                      </p:tavLst>
+                                    </p:anim>
+                                  </p:childTnLst>
+                                </p:cTn>
+                              </p:par>
+                            </p:childTnLst>
+                          </p:cTn>
+                        </p:par>
+                      </p:childTnLst>
+                    </p:cTn>
+                  </p:par>
+                  <p:par>
+                    <p:cTn id="24" fill="hold">
+                      <p:stCondLst>
+                        <p:cond delay="indefinite"/>
+                      </p:stCondLst>
+                      <p:childTnLst>
+                        <p:par>
+                          <p:cTn id="25" fill="hold">
+                            <p:stCondLst>
+                              <p:cond delay="0"/>
+                            </p:stCondLst>
+                            <p:childTnLst>
+                              <p:par>
+                                <p:cTn id="26" presetID="42" presetClass="entr" presetSubtype="0" fill="hold" grpId="0" nodeType="clickEffect">
+                                  <p:stCondLst>
+                                    <p:cond delay="0"/>
+                                  </p:stCondLst>
+                                  <p:childTnLst>
+                                    <p:set>
+                                      <p:cBhvr>
+                                        <p:cTn id="27" dur="1" fill="hold">
+                                          <p:stCondLst>
+                                            <p:cond delay="0"/>
+                                          </p:stCondLst>
+                                        </p:cTn>
+                                        <p:tgtEl>
+                                          <p:spTgt spid="3">
+                                            <p:txEl>
+                                              <p:pRg st="3" end="3"/>
+                                            </p:txEl>
+                                          </p:spTgt>
+                                        </p:tgtEl>
+                                        <p:attrNameLst>
+                                          <p:attrName>style.visibility</p:attrName>
+                                        </p:attrNameLst>
+                                      </p:cBhvr>
+                                      <p:to>
+                                        <p:strVal val="visible"/>
+                                      </p:to>
+                                    </p:set>
+                                    <p:animEffect transition="in" filter="fade">
+                                      <p:cBhvr>
+                                        <p:cTn id="28" dur="1000"/>
+                                        <p:tgtEl>
+                                          <p:spTgt spid="3">
+                                            <p:txEl>
+                                              <p:pRg st="3" end="3"/>
+                                            </p:txEl>
+                                          </p:spTgt>
+                                        </p:tgtEl>
+                                      </p:cBhvr>
+                                    </p:animEffect>
+                                    <p:anim calcmode="lin" valueType="num">
+                                      <p:cBhvr>
+                                        <p:cTn id="29" dur="1000" fill="hold"/>
+                                        <p:tgtEl>
+                                          <p:spTgt spid="3">
+                                            <p:txEl>
+                                              <p:pRg st="3" end="3"/>
+                                            </p:txEl>
+                                          </p:spTgt>
+                                        </p:tgtEl>
+                                        <p:attrNameLst>
+                                          <p:attrName>ppt_x</p:attrName>
+                                        </p:attrNameLst>
+                                      </p:cBhvr>
+                                      <p:tavLst>
+                                        <p:tav tm="0">
+                                          <p:val>
+                                            <p:strVal val="#ppt_x"/>
+                                          </p:val>
+                                        </p:tav>
+                                        <p:tav tm="100000">
+                                          <p:val>
+                                            <p:strVal val="#ppt_x"/>
+                                          </p:val>
+                                        </p:tav>
+                                      </p:tavLst>
+                                    </p:anim>
+                                    <p:anim calcmode="lin" valueType="num">
+                                      <p:cBhvr>
+                                        <p:cTn id="30" dur="1000" fill="hold"/>
+                                        <p:tgtEl>
+                                          <p:spTgt spid="3">
+                                            <p:txEl>
+                                              <p:pRg st="3" end="3"/>
+                                            </p:txEl>
+                                          </p:spTgt>
+                                        </p:tgtEl>
+                                        <p:attrNameLst>
+                                          <p:attrName>ppt_y</p:attrName>
+                                        </p:attrNameLst>
+                                      </p:cBhvr>
+                                      <p:tavLst>
+                                        <p:tav tm="0">
+                                          <p:val>
+                                            <p:strVal val="#ppt_y+.1"/>
+                                          </p:val>
+                                        </p:tav>
+                                        <p:tav tm="100000">
+                                          <p:val>
+                                            <p:strVal val="#ppt_y"/>
+                                          </p:val>
+                                        </p:tav>
+                                      </p:tavLst>
+                                    </p:anim>
+                                  </p:childTnLst>
+                                </p:cTn>
+                              </p:par>
+                            </p:childTnLst>
+                          </p:cTn>
+                        </p:par>
+                      </p:childTnLst>
+                    </p:cTn>
+                  </p:par>
+                  <p:par>
+                    <p:cTn id="31" fill="hold">
+                      <p:stCondLst>
+                        <p:cond delay="indefinite"/>
+                      </p:stCondLst>
+                      <p:childTnLst>
+                        <p:par>
+                          <p:cTn id="32" fill="hold">
+                            <p:stCondLst>
+                              <p:cond delay="0"/>
+                            </p:stCondLst>
+                            <p:childTnLst>
+                              <p:par>
+                                <p:cTn id="33" presetID="42" presetClass="entr" presetSubtype="0" fill="hold" grpId="0" nodeType="clickEffect">
+                                  <p:stCondLst>
+                                    <p:cond delay="0"/>
+                                  </p:stCondLst>
+                                  <p:childTnLst>
+                                    <p:set>
+                                      <p:cBhvr>
+                                        <p:cTn id="34" dur="1" fill="hold">
+                                          <p:stCondLst>
+                                            <p:cond delay="0"/>
+                                          </p:stCondLst>
+                                        </p:cTn>
+                                        <p:tgtEl>
+                                          <p:spTgt spid="3">
+                                            <p:txEl>
+                                              <p:pRg st="4" end="4"/>
+                                            </p:txEl>
+                                          </p:spTgt>
+                                        </p:tgtEl>
+                                        <p:attrNameLst>
+                                          <p:attrName>style.visibility</p:attrName>
+                                        </p:attrNameLst>
+                                      </p:cBhvr>
+                                      <p:to>
+                                        <p:strVal val="visible"/>
+                                      </p:to>
+                                    </p:set>
+                                    <p:animEffect transition="in" filter="fade">
+                                      <p:cBhvr>
+                                        <p:cTn id="35" dur="1000"/>
+                                        <p:tgtEl>
+                                          <p:spTgt spid="3">
+                                            <p:txEl>
+                                              <p:pRg st="4" end="4"/>
+                                            </p:txEl>
+                                          </p:spTgt>
+                                        </p:tgtEl>
+                                      </p:cBhvr>
+                                    </p:animEffect>
+                                    <p:anim calcmode="lin" valueType="num">
+                                      <p:cBhvr>
+                                        <p:cTn id="36" dur="1000" fill="hold"/>
+                                        <p:tgtEl>
+                                          <p:spTgt spid="3">
+                                            <p:txEl>
+                                              <p:pRg st="4" end="4"/>
+                                            </p:txEl>
+                                          </p:spTgt>
+                                        </p:tgtEl>
+                                        <p:attrNameLst>
+                                          <p:attrName>ppt_x</p:attrName>
+                                        </p:attrNameLst>
+                                      </p:cBhvr>
+                                      <p:tavLst>
+                                        <p:tav tm="0">
+                                          <p:val>
+                                            <p:strVal val="#ppt_x"/>
+                                          </p:val>
+                                        </p:tav>
+                                        <p:tav tm="100000">
+                                          <p:val>
+                                            <p:strVal val="#ppt_x"/>
+                                          </p:val>
+                                        </p:tav>
+                                      </p:tavLst>
+                                    </p:anim>
+                                    <p:anim calcmode="lin" valueType="num">
+                                      <p:cBhvr>
+                                        <p:cTn id="37" dur="1000" fill="hold"/>
+                                        <p:tgtEl>
+                                          <p:spTgt spid="3">
+                                            <p:txEl>
+                                              <p:pRg st="4" end="4"/>
+                                            </p:txEl>
+                                          </p:spTgt>
+                                        </p:tgtEl>
+                                        <p:attrNameLst>
+                                          <p:attrName>ppt_y</p:attrName>
+                                        </p:attrNameLst>
+                                      </p:cBhvr>
+                                      <p:tavLst>
+                                        <p:tav tm="0">
+                                          <p:val>
+                                            <p:strVal val="#ppt_y+.1"/>
+                                          </p:val>
+                                        </p:tav>
+                                        <p:tav tm="100000">
+                                          <p:val>
+                                            <p:strVal val="#ppt_y"/>
+                                          </p:val>
+                                        </p:tav>
+                                      </p:tavLst>
+                                    </p:anim>
+                                  </p:childTnLst>
+                                </p:cTn>
+                              </p:par>
+                            </p:childTnLst>
+                          </p:cTn>
+                        </p:par>
+                      </p:childTnLst>
+                    </p:cTn>
+                  </p:par>
+                  <p:par>
+                    <p:cTn id="38" fill="hold">
+                      <p:stCondLst>
+                        <p:cond delay="indefinite"/>
+                      </p:stCondLst>
+                      <p:childTnLst>
+                        <p:par>
+                          <p:cTn id="39" fill="hold">
+                            <p:stCondLst>
+                              <p:cond delay="0"/>
+                            </p:stCondLst>
+                            <p:childTnLst>
+                              <p:par>
+                                <p:cTn id="40" presetID="42" presetClass="entr" presetSubtype="0" fill="hold" grpId="0" nodeType="clickEffect">
+                                  <p:stCondLst>
+                                    <p:cond delay="0"/>
+                                  </p:stCondLst>
+                                  <p:childTnLst>
+                                    <p:set>
+                                      <p:cBhvr>
+                                        <p:cTn id="41" dur="1" fill="hold">
+                                          <p:stCondLst>
+                                            <p:cond delay="0"/>
+                                          </p:stCondLst>
+                                        </p:cTn>
+                                        <p:tgtEl>
+                                          <p:spTgt spid="3">
+                                            <p:txEl>
+                                              <p:pRg st="5" end="5"/>
+                                            </p:txEl>
+                                          </p:spTgt>
+                                        </p:tgtEl>
+                                        <p:attrNameLst>
+                                          <p:attrName>style.visibility</p:attrName>
+                                        </p:attrNameLst>
+                                      </p:cBhvr>
+                                      <p:to>
+                                        <p:strVal val="visible"/>
+                                      </p:to>
+                                    </p:set>
+                                    <p:animEffect transition="in" filter="fade">
+                                      <p:cBhvr>
+                                        <p:cTn id="42" dur="1000"/>
+                                        <p:tgtEl>
+                                          <p:spTgt spid="3">
+                                            <p:txEl>
+                                              <p:pRg st="5" end="5"/>
+                                            </p:txEl>
+                                          </p:spTgt>
+                                        </p:tgtEl>
+                                      </p:cBhvr>
+                                    </p:animEffect>
+                                    <p:anim calcmode="lin" valueType="num">
+                                      <p:cBhvr>
+                                        <p:cTn id="43" dur="1000" fill="hold"/>
+                                        <p:tgtEl>
+                                          <p:spTgt spid="3">
+                                            <p:txEl>
+                                              <p:pRg st="5" end="5"/>
+                                            </p:txEl>
+                                          </p:spTgt>
+                                        </p:tgtEl>
+                                        <p:attrNameLst>
+                                          <p:attrName>ppt_x</p:attrName>
+                                        </p:attrNameLst>
+                                      </p:cBhvr>
+                                      <p:tavLst>
+                                        <p:tav tm="0">
+                                          <p:val>
+                                            <p:strVal val="#ppt_x"/>
+                                          </p:val>
+                                        </p:tav>
+                                        <p:tav tm="100000">
+                                          <p:val>
+                                            <p:strVal val="#ppt_x"/>
+                                          </p:val>
+                                        </p:tav>
+                                      </p:tavLst>
+                                    </p:anim>
+                                    <p:anim calcmode="lin" valueType="num">
+                                      <p:cBhvr>
+                                        <p:cTn id="44" dur="1000" fill="hold"/>
+                                        <p:tgtEl>
+                                          <p:spTgt spid="3">
+                                            <p:txEl>
+                                              <p:pRg st="5" end="5"/>
+                                            </p:txEl>
+                                          </p:spTgt>
+                                        </p:tgtEl>
+                                        <p:attrNameLst>
+                                          <p:attrName>ppt_y</p:attrName>
+                                        </p:attrNameLst>
+                                      </p:cBhvr>
+                                      <p:tavLst>
+                                        <p:tav tm="0">
+                                          <p:val>
+                                            <p:strVal val="#ppt_y+.1"/>
+                                          </p:val>
+                                        </p:tav>
+                                        <p:tav tm="100000">
+                                          <p:val>
+                                            <p:strVal val="#ppt_y"/>
+                                          </p:val>
+                                        </p:tav>
+                                      </p:tavLst>
+                                    </p:anim>
+                                  </p:childTnLst>
+                                </p:cTn>
+                              </p:par>
+                            </p:childTnLst>
+                          </p:cTn>
+                        </p:par>
+                      </p:childTnLst>
+                    </p:cTn>
+                  </p:par>
+                  <p:par>
+                    <p:cTn id="45" fill="hold">
+                      <p:stCondLst>
+                        <p:cond delay="indefinite"/>
+                      </p:stCondLst>
+                      <p:childTnLst>
+                        <p:par>
+                          <p:cTn id="46" fill="hold">
+                            <p:stCondLst>
+                              <p:cond delay="0"/>
+                            </p:stCondLst>
+                            <p:childTnLst>
+                              <p:par>
+                                <p:cTn id="47" presetID="42" presetClass="entr" presetSubtype="0" fill="hold" grpId="0" nodeType="clickEffect">
+                                  <p:stCondLst>
+                                    <p:cond delay="0"/>
+                                  </p:stCondLst>
+                                  <p:childTnLst>
+                                    <p:set>
+                                      <p:cBhvr>
+                                        <p:cTn id="48" dur="1" fill="hold">
+                                          <p:stCondLst>
+                                            <p:cond delay="0"/>
+                                          </p:stCondLst>
+                                        </p:cTn>
+                                        <p:tgtEl>
+                                          <p:spTgt spid="3">
+                                            <p:txEl>
+                                              <p:pRg st="6" end="6"/>
+                                            </p:txEl>
+                                          </p:spTgt>
+                                        </p:tgtEl>
+                                        <p:attrNameLst>
+                                          <p:attrName>style.visibility</p:attrName>
+                                        </p:attrNameLst>
+                                      </p:cBhvr>
+                                      <p:to>
+                                        <p:strVal val="visible"/>
+                                      </p:to>
+                                    </p:set>
+                                    <p:animEffect transition="in" filter="fade">
+                                      <p:cBhvr>
+                                        <p:cTn id="49" dur="1000"/>
+                                        <p:tgtEl>
+                                          <p:spTgt spid="3">
+                                            <p:txEl>
+                                              <p:pRg st="6" end="6"/>
+                                            </p:txEl>
+                                          </p:spTgt>
+                                        </p:tgtEl>
+                                      </p:cBhvr>
+                                    </p:animEffect>
+                                    <p:anim calcmode="lin" valueType="num">
+                                      <p:cBhvr>
+                                        <p:cTn id="50" dur="1000" fill="hold"/>
+                                        <p:tgtEl>
+                                          <p:spTgt spid="3">
+                                            <p:txEl>
+                                              <p:pRg st="6" end="6"/>
+                                            </p:txEl>
+                                          </p:spTgt>
+                                        </p:tgtEl>
+                                        <p:attrNameLst>
+                                          <p:attrName>ppt_x</p:attrName>
+                                        </p:attrNameLst>
+                                      </p:cBhvr>
+                                      <p:tavLst>
+                                        <p:tav tm="0">
+                                          <p:val>
+                                            <p:strVal val="#ppt_x"/>
+                                          </p:val>
+                                        </p:tav>
+                                        <p:tav tm="100000">
+                                          <p:val>
+                                            <p:strVal val="#ppt_x"/>
+                                          </p:val>
+                                        </p:tav>
+                                      </p:tavLst>
+                                    </p:anim>
+                                    <p:anim calcmode="lin" valueType="num">
+                                      <p:cBhvr>
+                                        <p:cTn id="51" dur="1000" fill="hold"/>
+                                        <p:tgtEl>
+                                          <p:spTgt spid="3">
+                                            <p:txEl>
+                                              <p:pRg st="6" end="6"/>
+                                            </p:txEl>
+                                          </p:spTgt>
+                                        </p:tgtEl>
+                                        <p:attrNameLst>
+                                          <p:attrName>ppt_y</p:attrName>
+                                        </p:attrNameLst>
+                                      </p:cBhvr>
+                                      <p:tavLst>
+                                        <p:tav tm="0">
+                                          <p:val>
+                                            <p:strVal val="#ppt_y+.1"/>
+                                          </p:val>
+                                        </p:tav>
+                                        <p:tav tm="100000">
+                                          <p:val>
+                                            <p:strVal val="#ppt_y"/>
+                                          </p:val>
+                                        </p:tav>
+                                      </p:tavLst>
+                                    </p:anim>
+                                  </p:childTnLst>
+                                </p:cTn>
+                              </p:par>
+                            </p:childTnLst>
+                          </p:cTn>
+                        </p:par>
+                      </p:childTnLst>
+                    </p:cTn>
+                  </p:par>
+                </p:childTnLst>
+              </p:cTn>
+              <p:prevCondLst>
+                <p:cond evt="onPrev" delay="0">
+                  <p:tgtEl>
+                    <p:sldTgt/>
+                  </p:tgtEl>
+                </p:cond>
+              </p:prevCondLst>
+              <p:nextCondLst>
+                <p:cond evt="onNext" delay="0">
+                  <p:tgtEl>
+                    <p:sldTgt/>
+                  </p:tgtEl>
+                </p:cond>
+              </p:nextCondLst>
+            </p:seq>
+          </p:childTnLst>
+        </p:cTn>
+      </p:par>
+    </p:tnLst>
+    <p:bldLst>
+      <p:bldP spid="3" grpId="0" build="p"/>
+    </p:bldLst>
+  </p:timing>
 </p:sld>
 </file>
 
@@ -4628,6 +5392,26 @@
             </a:r>
           </a:p>
           <a:p>
+            <a:pPr>
+              <a:buFont typeface="Wingdings" panose="05000000000000000000" pitchFamily="2" charset="2"/>
+              <a:buChar char="Ø"/>
+            </a:pPr>
+            <a:r>
+              <a:rPr lang="en-US" b="1" dirty="0"/>
+              <a:t>Hypermedia for Actuator Web Endpoints</a:t>
+            </a:r>
+          </a:p>
+          <a:p>
+            <a:pPr lvl="1">
+              <a:buFont typeface="Wingdings" panose="05000000000000000000" pitchFamily="2" charset="2"/>
+              <a:buChar char="Ø"/>
+            </a:pPr>
+            <a:r>
+              <a:rPr lang="en-IN" dirty="0"/>
+              <a:t>/actuator</a:t>
+            </a:r>
+          </a:p>
+          <a:p>
             <a:endParaRPr lang="en-IN" dirty="0"/>
           </a:p>
         </p:txBody>
@@ -5311,6 +6095,218 @@
                                           <p:spTgt spid="3">
                                             <p:txEl>
                                               <p:pRg st="5" end="5"/>
+                                            </p:txEl>
+                                          </p:spTgt>
+                                        </p:tgtEl>
+                                        <p:attrNameLst>
+                                          <p:attrName>ppt_y</p:attrName>
+                                        </p:attrNameLst>
+                                      </p:cBhvr>
+                                      <p:tavLst>
+                                        <p:tav tm="0">
+                                          <p:val>
+                                            <p:strVal val="#ppt_y+.1"/>
+                                          </p:val>
+                                        </p:tav>
+                                        <p:tav tm="100000">
+                                          <p:val>
+                                            <p:strVal val="#ppt_y"/>
+                                          </p:val>
+                                        </p:tav>
+                                      </p:tavLst>
+                                    </p:anim>
+                                  </p:childTnLst>
+                                </p:cTn>
+                              </p:par>
+                            </p:childTnLst>
+                          </p:cTn>
+                        </p:par>
+                      </p:childTnLst>
+                    </p:cTn>
+                  </p:par>
+                  <p:par>
+                    <p:cTn id="45" fill="hold">
+                      <p:stCondLst>
+                        <p:cond delay="indefinite"/>
+                      </p:stCondLst>
+                      <p:childTnLst>
+                        <p:par>
+                          <p:cTn id="46" fill="hold">
+                            <p:stCondLst>
+                              <p:cond delay="0"/>
+                            </p:stCondLst>
+                            <p:childTnLst>
+                              <p:par>
+                                <p:cTn id="47" presetID="42" presetClass="entr" presetSubtype="0" fill="hold" grpId="0" nodeType="clickEffect">
+                                  <p:stCondLst>
+                                    <p:cond delay="0"/>
+                                  </p:stCondLst>
+                                  <p:childTnLst>
+                                    <p:set>
+                                      <p:cBhvr>
+                                        <p:cTn id="48" dur="1" fill="hold">
+                                          <p:stCondLst>
+                                            <p:cond delay="0"/>
+                                          </p:stCondLst>
+                                        </p:cTn>
+                                        <p:tgtEl>
+                                          <p:spTgt spid="3">
+                                            <p:txEl>
+                                              <p:pRg st="6" end="6"/>
+                                            </p:txEl>
+                                          </p:spTgt>
+                                        </p:tgtEl>
+                                        <p:attrNameLst>
+                                          <p:attrName>style.visibility</p:attrName>
+                                        </p:attrNameLst>
+                                      </p:cBhvr>
+                                      <p:to>
+                                        <p:strVal val="visible"/>
+                                      </p:to>
+                                    </p:set>
+                                    <p:animEffect transition="in" filter="fade">
+                                      <p:cBhvr>
+                                        <p:cTn id="49" dur="1000"/>
+                                        <p:tgtEl>
+                                          <p:spTgt spid="3">
+                                            <p:txEl>
+                                              <p:pRg st="6" end="6"/>
+                                            </p:txEl>
+                                          </p:spTgt>
+                                        </p:tgtEl>
+                                      </p:cBhvr>
+                                    </p:animEffect>
+                                    <p:anim calcmode="lin" valueType="num">
+                                      <p:cBhvr>
+                                        <p:cTn id="50" dur="1000" fill="hold"/>
+                                        <p:tgtEl>
+                                          <p:spTgt spid="3">
+                                            <p:txEl>
+                                              <p:pRg st="6" end="6"/>
+                                            </p:txEl>
+                                          </p:spTgt>
+                                        </p:tgtEl>
+                                        <p:attrNameLst>
+                                          <p:attrName>ppt_x</p:attrName>
+                                        </p:attrNameLst>
+                                      </p:cBhvr>
+                                      <p:tavLst>
+                                        <p:tav tm="0">
+                                          <p:val>
+                                            <p:strVal val="#ppt_x"/>
+                                          </p:val>
+                                        </p:tav>
+                                        <p:tav tm="100000">
+                                          <p:val>
+                                            <p:strVal val="#ppt_x"/>
+                                          </p:val>
+                                        </p:tav>
+                                      </p:tavLst>
+                                    </p:anim>
+                                    <p:anim calcmode="lin" valueType="num">
+                                      <p:cBhvr>
+                                        <p:cTn id="51" dur="1000" fill="hold"/>
+                                        <p:tgtEl>
+                                          <p:spTgt spid="3">
+                                            <p:txEl>
+                                              <p:pRg st="6" end="6"/>
+                                            </p:txEl>
+                                          </p:spTgt>
+                                        </p:tgtEl>
+                                        <p:attrNameLst>
+                                          <p:attrName>ppt_y</p:attrName>
+                                        </p:attrNameLst>
+                                      </p:cBhvr>
+                                      <p:tavLst>
+                                        <p:tav tm="0">
+                                          <p:val>
+                                            <p:strVal val="#ppt_y+.1"/>
+                                          </p:val>
+                                        </p:tav>
+                                        <p:tav tm="100000">
+                                          <p:val>
+                                            <p:strVal val="#ppt_y"/>
+                                          </p:val>
+                                        </p:tav>
+                                      </p:tavLst>
+                                    </p:anim>
+                                  </p:childTnLst>
+                                </p:cTn>
+                              </p:par>
+                              <p:par>
+                                <p:cTn id="52" presetID="42" presetClass="entr" presetSubtype="0" fill="hold" grpId="0" nodeType="withEffect">
+                                  <p:stCondLst>
+                                    <p:cond delay="0"/>
+                                  </p:stCondLst>
+                                  <p:childTnLst>
+                                    <p:set>
+                                      <p:cBhvr>
+                                        <p:cTn id="53" dur="1" fill="hold">
+                                          <p:stCondLst>
+                                            <p:cond delay="0"/>
+                                          </p:stCondLst>
+                                        </p:cTn>
+                                        <p:tgtEl>
+                                          <p:spTgt spid="3">
+                                            <p:txEl>
+                                              <p:pRg st="7" end="7"/>
+                                            </p:txEl>
+                                          </p:spTgt>
+                                        </p:tgtEl>
+                                        <p:attrNameLst>
+                                          <p:attrName>style.visibility</p:attrName>
+                                        </p:attrNameLst>
+                                      </p:cBhvr>
+                                      <p:to>
+                                        <p:strVal val="visible"/>
+                                      </p:to>
+                                    </p:set>
+                                    <p:animEffect transition="in" filter="fade">
+                                      <p:cBhvr>
+                                        <p:cTn id="54" dur="1000"/>
+                                        <p:tgtEl>
+                                          <p:spTgt spid="3">
+                                            <p:txEl>
+                                              <p:pRg st="7" end="7"/>
+                                            </p:txEl>
+                                          </p:spTgt>
+                                        </p:tgtEl>
+                                      </p:cBhvr>
+                                    </p:animEffect>
+                                    <p:anim calcmode="lin" valueType="num">
+                                      <p:cBhvr>
+                                        <p:cTn id="55" dur="1000" fill="hold"/>
+                                        <p:tgtEl>
+                                          <p:spTgt spid="3">
+                                            <p:txEl>
+                                              <p:pRg st="7" end="7"/>
+                                            </p:txEl>
+                                          </p:spTgt>
+                                        </p:tgtEl>
+                                        <p:attrNameLst>
+                                          <p:attrName>ppt_x</p:attrName>
+                                        </p:attrNameLst>
+                                      </p:cBhvr>
+                                      <p:tavLst>
+                                        <p:tav tm="0">
+                                          <p:val>
+                                            <p:strVal val="#ppt_x"/>
+                                          </p:val>
+                                        </p:tav>
+                                        <p:tav tm="100000">
+                                          <p:val>
+                                            <p:strVal val="#ppt_x"/>
+                                          </p:val>
+                                        </p:tav>
+                                      </p:tavLst>
+                                    </p:anim>
+                                    <p:anim calcmode="lin" valueType="num">
+                                      <p:cBhvr>
+                                        <p:cTn id="56" dur="1000" fill="hold"/>
+                                        <p:tgtEl>
+                                          <p:spTgt spid="3">
+                                            <p:txEl>
+                                              <p:pRg st="7" end="7"/>
                                             </p:txEl>
                                           </p:spTgt>
                                         </p:tgtEl>
@@ -6294,12 +7290,48 @@
               <a:buChar char="Ø"/>
             </a:pPr>
             <a:r>
-              <a:rPr lang="en-US" b="1" dirty="0"/>
+              <a:rPr lang="en-US" i="1" dirty="0" err="1">
+                <a:solidFill>
+                  <a:srgbClr val="00B0F0"/>
+                </a:solidFill>
+              </a:rPr>
+              <a:t>management.endpoints.web.exposure</a:t>
+            </a:r>
+            <a:r>
+              <a:rPr lang="en-US" sz="2800" i="1" dirty="0" err="1">
+                <a:solidFill>
+                  <a:srgbClr val="00B0F0"/>
+                </a:solidFill>
+              </a:rPr>
+              <a:t>.</a:t>
+            </a:r>
+            <a:r>
+              <a:rPr lang="en-US" sz="2400" i="1" dirty="0" err="1">
+                <a:solidFill>
+                  <a:srgbClr val="00B0F0"/>
+                </a:solidFill>
+              </a:rPr>
+              <a:t>include</a:t>
+            </a:r>
+            <a:r>
+              <a:rPr lang="en-US" i="1" dirty="0">
+                <a:solidFill>
+                  <a:srgbClr val="00B0F0"/>
+                </a:solidFill>
+              </a:rPr>
+              <a:t>= </a:t>
+            </a:r>
+            <a:r>
+              <a:rPr lang="en-US" b="1" dirty="0">
+                <a:solidFill>
+                  <a:srgbClr val="00B0F0"/>
+                </a:solidFill>
+              </a:rPr>
               <a:t>*</a:t>
             </a:r>
             <a:r>
               <a:rPr lang="en-US" dirty="0"/>
-              <a:t> can be used to select all the endpoints</a:t>
+              <a:t> (All the endpoints)</a:t>
             </a:r>
           </a:p>
           <a:p>
@@ -7011,7 +8043,7 @@
           <a:p>
             <a:r>
               <a:rPr lang="en-IN" b="1" dirty="0"/>
-              <a:t>Securing HTTP Endpoints</a:t>
+              <a:t>Configuring Endpoints</a:t>
             </a:r>
             <a:endParaRPr lang="en-IN" dirty="0"/>
           </a:p>
@@ -7043,8 +8075,8 @@
               <a:buChar char="Ø"/>
             </a:pPr>
             <a:r>
-              <a:rPr lang="en-US" dirty="0"/>
-              <a:t>Securing HTTP endpoints in the same way that we do with any other sensitive URL</a:t>
+              <a:rPr lang="en-IN" dirty="0"/>
+              <a:t>Endpoints automatically caches the response which don’t take any parameter.</a:t>
             </a:r>
           </a:p>
           <a:p>
@@ -7053,8 +8085,22 @@
               <a:buChar char="Ø"/>
             </a:pPr>
             <a:r>
-              <a:rPr lang="en-US" dirty="0"/>
-              <a:t>If </a:t>
+              <a:rPr lang="en-IN" dirty="0"/>
+              <a:t>We can control this feature as follows</a:t>
+            </a:r>
+          </a:p>
+          <a:p>
+            <a:pPr>
+              <a:buFont typeface="Wingdings" panose="05000000000000000000" pitchFamily="2" charset="2"/>
+              <a:buChar char="Ø"/>
+            </a:pPr>
+            <a:r>
+              <a:rPr lang="en-US" i="1" dirty="0" err="1">
+                <a:solidFill>
+                  <a:srgbClr val="00B0F0"/>
+                </a:solidFill>
+              </a:rPr>
+              <a:t>management.endpoint.beans.cache.time</a:t>
             </a:r>
             <a:r>
               <a:rPr lang="en-US" i="1" dirty="0">
@@ -7062,15 +8108,7 @@
                   <a:srgbClr val="00B0F0"/>
                 </a:solidFill>
               </a:rPr>
-              <a:t>spring-boot-starter-security </a:t>
-            </a:r>
-            <a:r>
-              <a:rPr lang="en-US" dirty="0"/>
-              <a:t>dependency is in the class path then all the endpoint except /health and /info </a:t>
-            </a:r>
-            <a:r>
-              <a:rPr lang="en-US"/>
-              <a:t>are secured</a:t>
+              <a:t>-to-live=10s</a:t>
             </a:r>
           </a:p>
           <a:p>
@@ -7078,20 +8116,549 @@
               <a:buFont typeface="Wingdings" panose="05000000000000000000" pitchFamily="2" charset="2"/>
               <a:buChar char="Ø"/>
             </a:pPr>
-            <a:endParaRPr lang="en-IN" dirty="0"/>
+            <a:r>
+              <a:rPr lang="en-US" dirty="0"/>
+              <a:t>The prefix </a:t>
+            </a:r>
+            <a:r>
+              <a:rPr lang="en-US" i="1" dirty="0" err="1">
+                <a:solidFill>
+                  <a:srgbClr val="00B0F0"/>
+                </a:solidFill>
+              </a:rPr>
+              <a:t>management.endpoint</a:t>
+            </a:r>
+            <a:r>
+              <a:rPr lang="en-US" i="1" dirty="0">
+                <a:solidFill>
+                  <a:srgbClr val="00B0F0"/>
+                </a:solidFill>
+              </a:rPr>
+              <a:t>.&lt;name&gt; </a:t>
+            </a:r>
+            <a:r>
+              <a:rPr lang="en-US" dirty="0"/>
+              <a:t>is used to uniquely identify the endpoint that is being configured</a:t>
+            </a:r>
+            <a:r>
+              <a:rPr lang="en-US" i="1" dirty="0">
+                <a:solidFill>
+                  <a:srgbClr val="00B0F0"/>
+                </a:solidFill>
+              </a:rPr>
+              <a:t>.</a:t>
+            </a:r>
+            <a:endParaRPr lang="en-IN" i="1" dirty="0">
+              <a:solidFill>
+                <a:srgbClr val="00B0F0"/>
+              </a:solidFill>
+            </a:endParaRPr>
           </a:p>
         </p:txBody>
       </p:sp>
     </p:spTree>
     <p:extLst>
       <p:ext uri="{BB962C8B-B14F-4D97-AF65-F5344CB8AC3E}">
-        <p14:creationId xmlns:p14="http://schemas.microsoft.com/office/powerpoint/2010/main" val="1942379050"/>
+        <p14:creationId xmlns:p14="http://schemas.microsoft.com/office/powerpoint/2010/main" val="2600926785"/>
       </p:ext>
     </p:extLst>
   </p:cSld>
   <p:clrMapOvr>
     <a:masterClrMapping/>
   </p:clrMapOvr>
+  <p:timing>
+    <p:tnLst>
+      <p:par>
+        <p:cTn id="1" dur="indefinite" restart="never" nodeType="tmRoot">
+          <p:childTnLst>
+            <p:seq concurrent="1" nextAc="seek">
+              <p:cTn id="2" dur="indefinite" nodeType="mainSeq">
+                <p:childTnLst>
+                  <p:par>
+                    <p:cTn id="3" fill="hold">
+                      <p:stCondLst>
+                        <p:cond delay="indefinite"/>
+                      </p:stCondLst>
+                      <p:childTnLst>
+                        <p:par>
+                          <p:cTn id="4" fill="hold">
+                            <p:stCondLst>
+                              <p:cond delay="0"/>
+                            </p:stCondLst>
+                            <p:childTnLst>
+                              <p:par>
+                                <p:cTn id="5" presetID="42" presetClass="entr" presetSubtype="0" fill="hold" grpId="0" nodeType="clickEffect">
+                                  <p:stCondLst>
+                                    <p:cond delay="0"/>
+                                  </p:stCondLst>
+                                  <p:childTnLst>
+                                    <p:set>
+                                      <p:cBhvr>
+                                        <p:cTn id="6" dur="1" fill="hold">
+                                          <p:stCondLst>
+                                            <p:cond delay="0"/>
+                                          </p:stCondLst>
+                                        </p:cTn>
+                                        <p:tgtEl>
+                                          <p:spTgt spid="3">
+                                            <p:txEl>
+                                              <p:pRg st="0" end="0"/>
+                                            </p:txEl>
+                                          </p:spTgt>
+                                        </p:tgtEl>
+                                        <p:attrNameLst>
+                                          <p:attrName>style.visibility</p:attrName>
+                                        </p:attrNameLst>
+                                      </p:cBhvr>
+                                      <p:to>
+                                        <p:strVal val="visible"/>
+                                      </p:to>
+                                    </p:set>
+                                    <p:animEffect transition="in" filter="fade">
+                                      <p:cBhvr>
+                                        <p:cTn id="7" dur="1000"/>
+                                        <p:tgtEl>
+                                          <p:spTgt spid="3">
+                                            <p:txEl>
+                                              <p:pRg st="0" end="0"/>
+                                            </p:txEl>
+                                          </p:spTgt>
+                                        </p:tgtEl>
+                                      </p:cBhvr>
+                                    </p:animEffect>
+                                    <p:anim calcmode="lin" valueType="num">
+                                      <p:cBhvr>
+                                        <p:cTn id="8" dur="1000" fill="hold"/>
+                                        <p:tgtEl>
+                                          <p:spTgt spid="3">
+                                            <p:txEl>
+                                              <p:pRg st="0" end="0"/>
+                                            </p:txEl>
+                                          </p:spTgt>
+                                        </p:tgtEl>
+                                        <p:attrNameLst>
+                                          <p:attrName>ppt_x</p:attrName>
+                                        </p:attrNameLst>
+                                      </p:cBhvr>
+                                      <p:tavLst>
+                                        <p:tav tm="0">
+                                          <p:val>
+                                            <p:strVal val="#ppt_x"/>
+                                          </p:val>
+                                        </p:tav>
+                                        <p:tav tm="100000">
+                                          <p:val>
+                                            <p:strVal val="#ppt_x"/>
+                                          </p:val>
+                                        </p:tav>
+                                      </p:tavLst>
+                                    </p:anim>
+                                    <p:anim calcmode="lin" valueType="num">
+                                      <p:cBhvr>
+                                        <p:cTn id="9" dur="1000" fill="hold"/>
+                                        <p:tgtEl>
+                                          <p:spTgt spid="3">
+                                            <p:txEl>
+                                              <p:pRg st="0" end="0"/>
+                                            </p:txEl>
+                                          </p:spTgt>
+                                        </p:tgtEl>
+                                        <p:attrNameLst>
+                                          <p:attrName>ppt_y</p:attrName>
+                                        </p:attrNameLst>
+                                      </p:cBhvr>
+                                      <p:tavLst>
+                                        <p:tav tm="0">
+                                          <p:val>
+                                            <p:strVal val="#ppt_y+.1"/>
+                                          </p:val>
+                                        </p:tav>
+                                        <p:tav tm="100000">
+                                          <p:val>
+                                            <p:strVal val="#ppt_y"/>
+                                          </p:val>
+                                        </p:tav>
+                                      </p:tavLst>
+                                    </p:anim>
+                                  </p:childTnLst>
+                                </p:cTn>
+                              </p:par>
+                            </p:childTnLst>
+                          </p:cTn>
+                        </p:par>
+                      </p:childTnLst>
+                    </p:cTn>
+                  </p:par>
+                  <p:par>
+                    <p:cTn id="10" fill="hold">
+                      <p:stCondLst>
+                        <p:cond delay="indefinite"/>
+                      </p:stCondLst>
+                      <p:childTnLst>
+                        <p:par>
+                          <p:cTn id="11" fill="hold">
+                            <p:stCondLst>
+                              <p:cond delay="0"/>
+                            </p:stCondLst>
+                            <p:childTnLst>
+                              <p:par>
+                                <p:cTn id="12" presetID="42" presetClass="entr" presetSubtype="0" fill="hold" grpId="0" nodeType="clickEffect">
+                                  <p:stCondLst>
+                                    <p:cond delay="0"/>
+                                  </p:stCondLst>
+                                  <p:childTnLst>
+                                    <p:set>
+                                      <p:cBhvr>
+                                        <p:cTn id="13" dur="1" fill="hold">
+                                          <p:stCondLst>
+                                            <p:cond delay="0"/>
+                                          </p:stCondLst>
+                                        </p:cTn>
+                                        <p:tgtEl>
+                                          <p:spTgt spid="3">
+                                            <p:txEl>
+                                              <p:pRg st="1" end="1"/>
+                                            </p:txEl>
+                                          </p:spTgt>
+                                        </p:tgtEl>
+                                        <p:attrNameLst>
+                                          <p:attrName>style.visibility</p:attrName>
+                                        </p:attrNameLst>
+                                      </p:cBhvr>
+                                      <p:to>
+                                        <p:strVal val="visible"/>
+                                      </p:to>
+                                    </p:set>
+                                    <p:animEffect transition="in" filter="fade">
+                                      <p:cBhvr>
+                                        <p:cTn id="14" dur="1000"/>
+                                        <p:tgtEl>
+                                          <p:spTgt spid="3">
+                                            <p:txEl>
+                                              <p:pRg st="1" end="1"/>
+                                            </p:txEl>
+                                          </p:spTgt>
+                                        </p:tgtEl>
+                                      </p:cBhvr>
+                                    </p:animEffect>
+                                    <p:anim calcmode="lin" valueType="num">
+                                      <p:cBhvr>
+                                        <p:cTn id="15" dur="1000" fill="hold"/>
+                                        <p:tgtEl>
+                                          <p:spTgt spid="3">
+                                            <p:txEl>
+                                              <p:pRg st="1" end="1"/>
+                                            </p:txEl>
+                                          </p:spTgt>
+                                        </p:tgtEl>
+                                        <p:attrNameLst>
+                                          <p:attrName>ppt_x</p:attrName>
+                                        </p:attrNameLst>
+                                      </p:cBhvr>
+                                      <p:tavLst>
+                                        <p:tav tm="0">
+                                          <p:val>
+                                            <p:strVal val="#ppt_x"/>
+                                          </p:val>
+                                        </p:tav>
+                                        <p:tav tm="100000">
+                                          <p:val>
+                                            <p:strVal val="#ppt_x"/>
+                                          </p:val>
+                                        </p:tav>
+                                      </p:tavLst>
+                                    </p:anim>
+                                    <p:anim calcmode="lin" valueType="num">
+                                      <p:cBhvr>
+                                        <p:cTn id="16" dur="1000" fill="hold"/>
+                                        <p:tgtEl>
+                                          <p:spTgt spid="3">
+                                            <p:txEl>
+                                              <p:pRg st="1" end="1"/>
+                                            </p:txEl>
+                                          </p:spTgt>
+                                        </p:tgtEl>
+                                        <p:attrNameLst>
+                                          <p:attrName>ppt_y</p:attrName>
+                                        </p:attrNameLst>
+                                      </p:cBhvr>
+                                      <p:tavLst>
+                                        <p:tav tm="0">
+                                          <p:val>
+                                            <p:strVal val="#ppt_y+.1"/>
+                                          </p:val>
+                                        </p:tav>
+                                        <p:tav tm="100000">
+                                          <p:val>
+                                            <p:strVal val="#ppt_y"/>
+                                          </p:val>
+                                        </p:tav>
+                                      </p:tavLst>
+                                    </p:anim>
+                                  </p:childTnLst>
+                                </p:cTn>
+                              </p:par>
+                            </p:childTnLst>
+                          </p:cTn>
+                        </p:par>
+                      </p:childTnLst>
+                    </p:cTn>
+                  </p:par>
+                  <p:par>
+                    <p:cTn id="17" fill="hold">
+                      <p:stCondLst>
+                        <p:cond delay="indefinite"/>
+                      </p:stCondLst>
+                      <p:childTnLst>
+                        <p:par>
+                          <p:cTn id="18" fill="hold">
+                            <p:stCondLst>
+                              <p:cond delay="0"/>
+                            </p:stCondLst>
+                            <p:childTnLst>
+                              <p:par>
+                                <p:cTn id="19" presetID="42" presetClass="entr" presetSubtype="0" fill="hold" grpId="0" nodeType="clickEffect">
+                                  <p:stCondLst>
+                                    <p:cond delay="0"/>
+                                  </p:stCondLst>
+                                  <p:childTnLst>
+                                    <p:set>
+                                      <p:cBhvr>
+                                        <p:cTn id="20" dur="1" fill="hold">
+                                          <p:stCondLst>
+                                            <p:cond delay="0"/>
+                                          </p:stCondLst>
+                                        </p:cTn>
+                                        <p:tgtEl>
+                                          <p:spTgt spid="3">
+                                            <p:txEl>
+                                              <p:pRg st="2" end="2"/>
+                                            </p:txEl>
+                                          </p:spTgt>
+                                        </p:tgtEl>
+                                        <p:attrNameLst>
+                                          <p:attrName>style.visibility</p:attrName>
+                                        </p:attrNameLst>
+                                      </p:cBhvr>
+                                      <p:to>
+                                        <p:strVal val="visible"/>
+                                      </p:to>
+                                    </p:set>
+                                    <p:animEffect transition="in" filter="fade">
+                                      <p:cBhvr>
+                                        <p:cTn id="21" dur="1000"/>
+                                        <p:tgtEl>
+                                          <p:spTgt spid="3">
+                                            <p:txEl>
+                                              <p:pRg st="2" end="2"/>
+                                            </p:txEl>
+                                          </p:spTgt>
+                                        </p:tgtEl>
+                                      </p:cBhvr>
+                                    </p:animEffect>
+                                    <p:anim calcmode="lin" valueType="num">
+                                      <p:cBhvr>
+                                        <p:cTn id="22" dur="1000" fill="hold"/>
+                                        <p:tgtEl>
+                                          <p:spTgt spid="3">
+                                            <p:txEl>
+                                              <p:pRg st="2" end="2"/>
+                                            </p:txEl>
+                                          </p:spTgt>
+                                        </p:tgtEl>
+                                        <p:attrNameLst>
+                                          <p:attrName>ppt_x</p:attrName>
+                                        </p:attrNameLst>
+                                      </p:cBhvr>
+                                      <p:tavLst>
+                                        <p:tav tm="0">
+                                          <p:val>
+                                            <p:strVal val="#ppt_x"/>
+                                          </p:val>
+                                        </p:tav>
+                                        <p:tav tm="100000">
+                                          <p:val>
+                                            <p:strVal val="#ppt_x"/>
+                                          </p:val>
+                                        </p:tav>
+                                      </p:tavLst>
+                                    </p:anim>
+                                    <p:anim calcmode="lin" valueType="num">
+                                      <p:cBhvr>
+                                        <p:cTn id="23" dur="1000" fill="hold"/>
+                                        <p:tgtEl>
+                                          <p:spTgt spid="3">
+                                            <p:txEl>
+                                              <p:pRg st="2" end="2"/>
+                                            </p:txEl>
+                                          </p:spTgt>
+                                        </p:tgtEl>
+                                        <p:attrNameLst>
+                                          <p:attrName>ppt_y</p:attrName>
+                                        </p:attrNameLst>
+                                      </p:cBhvr>
+                                      <p:tavLst>
+                                        <p:tav tm="0">
+                                          <p:val>
+                                            <p:strVal val="#ppt_y+.1"/>
+                                          </p:val>
+                                        </p:tav>
+                                        <p:tav tm="100000">
+                                          <p:val>
+                                            <p:strVal val="#ppt_y"/>
+                                          </p:val>
+                                        </p:tav>
+                                      </p:tavLst>
+                                    </p:anim>
+                                  </p:childTnLst>
+                                </p:cTn>
+                              </p:par>
+                            </p:childTnLst>
+                          </p:cTn>
+                        </p:par>
+                      </p:childTnLst>
+                    </p:cTn>
+                  </p:par>
+                  <p:par>
+                    <p:cTn id="24" fill="hold">
+                      <p:stCondLst>
+                        <p:cond delay="indefinite"/>
+                      </p:stCondLst>
+                      <p:childTnLst>
+                        <p:par>
+                          <p:cTn id="25" fill="hold">
+                            <p:stCondLst>
+                              <p:cond delay="0"/>
+                            </p:stCondLst>
+                            <p:childTnLst>
+                              <p:par>
+                                <p:cTn id="26" presetID="42" presetClass="entr" presetSubtype="0" fill="hold" grpId="0" nodeType="clickEffect">
+                                  <p:stCondLst>
+                                    <p:cond delay="0"/>
+                                  </p:stCondLst>
+                                  <p:childTnLst>
+                                    <p:set>
+                                      <p:cBhvr>
+                                        <p:cTn id="27" dur="1" fill="hold">
+                                          <p:stCondLst>
+                                            <p:cond delay="0"/>
+                                          </p:stCondLst>
+                                        </p:cTn>
+                                        <p:tgtEl>
+                                          <p:spTgt spid="3">
+                                            <p:txEl>
+                                              <p:pRg st="3" end="3"/>
+                                            </p:txEl>
+                                          </p:spTgt>
+                                        </p:tgtEl>
+                                        <p:attrNameLst>
+                                          <p:attrName>style.visibility</p:attrName>
+                                        </p:attrNameLst>
+                                      </p:cBhvr>
+                                      <p:to>
+                                        <p:strVal val="visible"/>
+                                      </p:to>
+                                    </p:set>
+                                    <p:animEffect transition="in" filter="fade">
+                                      <p:cBhvr>
+                                        <p:cTn id="28" dur="1000"/>
+                                        <p:tgtEl>
+                                          <p:spTgt spid="3">
+                                            <p:txEl>
+                                              <p:pRg st="3" end="3"/>
+                                            </p:txEl>
+                                          </p:spTgt>
+                                        </p:tgtEl>
+                                      </p:cBhvr>
+                                    </p:animEffect>
+                                    <p:anim calcmode="lin" valueType="num">
+                                      <p:cBhvr>
+                                        <p:cTn id="29" dur="1000" fill="hold"/>
+                                        <p:tgtEl>
+                                          <p:spTgt spid="3">
+                                            <p:txEl>
+                                              <p:pRg st="3" end="3"/>
+                                            </p:txEl>
+                                          </p:spTgt>
+                                        </p:tgtEl>
+                                        <p:attrNameLst>
+                                          <p:attrName>ppt_x</p:attrName>
+                                        </p:attrNameLst>
+                                      </p:cBhvr>
+                                      <p:tavLst>
+                                        <p:tav tm="0">
+                                          <p:val>
+                                            <p:strVal val="#ppt_x"/>
+                                          </p:val>
+                                        </p:tav>
+                                        <p:tav tm="100000">
+                                          <p:val>
+                                            <p:strVal val="#ppt_x"/>
+                                          </p:val>
+                                        </p:tav>
+                                      </p:tavLst>
+                                    </p:anim>
+                                    <p:anim calcmode="lin" valueType="num">
+                                      <p:cBhvr>
+                                        <p:cTn id="30" dur="1000" fill="hold"/>
+                                        <p:tgtEl>
+                                          <p:spTgt spid="3">
+                                            <p:txEl>
+                                              <p:pRg st="3" end="3"/>
+                                            </p:txEl>
+                                          </p:spTgt>
+                                        </p:tgtEl>
+                                        <p:attrNameLst>
+                                          <p:attrName>ppt_y</p:attrName>
+                                        </p:attrNameLst>
+                                      </p:cBhvr>
+                                      <p:tavLst>
+                                        <p:tav tm="0">
+                                          <p:val>
+                                            <p:strVal val="#ppt_y+.1"/>
+                                          </p:val>
+                                        </p:tav>
+                                        <p:tav tm="100000">
+                                          <p:val>
+                                            <p:strVal val="#ppt_y"/>
+                                          </p:val>
+                                        </p:tav>
+                                      </p:tavLst>
+                                    </p:anim>
+                                  </p:childTnLst>
+                                </p:cTn>
+                              </p:par>
+                            </p:childTnLst>
+                          </p:cTn>
+                        </p:par>
+                      </p:childTnLst>
+                    </p:cTn>
+                  </p:par>
+                </p:childTnLst>
+              </p:cTn>
+              <p:prevCondLst>
+                <p:cond evt="onPrev" delay="0">
+                  <p:tgtEl>
+                    <p:sldTgt/>
+                  </p:tgtEl>
+                </p:cond>
+              </p:prevCondLst>
+              <p:nextCondLst>
+                <p:cond evt="onNext" delay="0">
+                  <p:tgtEl>
+                    <p:sldTgt/>
+                  </p:tgtEl>
+                </p:cond>
+              </p:nextCondLst>
+            </p:seq>
+          </p:childTnLst>
+        </p:cTn>
+      </p:par>
+    </p:tnLst>
+    <p:bldLst>
+      <p:bldP spid="3" grpId="0" build="p"/>
+    </p:bldLst>
+  </p:timing>
 </p:sld>
 </file>
 
@@ -7160,7 +8727,7 @@
           <a:p>
             <a:r>
               <a:rPr lang="en-IN" b="1" dirty="0"/>
-              <a:t>Configuring Endpoints</a:t>
+              <a:t>Implementing Custom Endpoints</a:t>
             </a:r>
             <a:endParaRPr lang="en-IN" dirty="0"/>
           </a:p>
@@ -7194,7 +8761,7 @@
     </p:spTree>
     <p:extLst>
       <p:ext uri="{BB962C8B-B14F-4D97-AF65-F5344CB8AC3E}">
-        <p14:creationId xmlns:p14="http://schemas.microsoft.com/office/powerpoint/2010/main" val="2600926785"/>
+        <p14:creationId xmlns:p14="http://schemas.microsoft.com/office/powerpoint/2010/main" val="2645937587"/>
       </p:ext>
     </p:extLst>
   </p:cSld>
@@ -7268,8 +8835,8 @@
           <a:lstStyle/>
           <a:p>
             <a:r>
-              <a:rPr lang="en-US" b="1" dirty="0"/>
-              <a:t>Hypermedia for Actuator Web Endpoints</a:t>
+              <a:rPr lang="en-IN" b="1" dirty="0"/>
+              <a:t>Writing custom health indicators	</a:t>
             </a:r>
             <a:endParaRPr lang="en-IN" dirty="0"/>
           </a:p>
@@ -7296,20 +8863,183 @@
           <a:bodyPr/>
           <a:lstStyle/>
           <a:p>
-            <a:endParaRPr lang="en-IN"/>
+            <a:pPr>
+              <a:buFont typeface="Wingdings" panose="05000000000000000000" pitchFamily="2" charset="2"/>
+              <a:buChar char="Ø"/>
+            </a:pPr>
+            <a:r>
+              <a:rPr lang="en-IN" dirty="0"/>
+              <a:t>implement the </a:t>
+            </a:r>
+            <a:r>
+              <a:rPr lang="en-IN" dirty="0" err="1"/>
+              <a:t>HealthIndicator</a:t>
+            </a:r>
+            <a:r>
+              <a:rPr lang="en-IN" dirty="0"/>
+              <a:t> interface.</a:t>
+            </a:r>
           </a:p>
         </p:txBody>
       </p:sp>
     </p:spTree>
     <p:extLst>
       <p:ext uri="{BB962C8B-B14F-4D97-AF65-F5344CB8AC3E}">
-        <p14:creationId xmlns:p14="http://schemas.microsoft.com/office/powerpoint/2010/main" val="242127232"/>
+        <p14:creationId xmlns:p14="http://schemas.microsoft.com/office/powerpoint/2010/main" val="4130093711"/>
       </p:ext>
     </p:extLst>
   </p:cSld>
   <p:clrMapOvr>
     <a:masterClrMapping/>
   </p:clrMapOvr>
+  <p:timing>
+    <p:tnLst>
+      <p:par>
+        <p:cTn id="1" dur="indefinite" restart="never" nodeType="tmRoot">
+          <p:childTnLst>
+            <p:seq concurrent="1" nextAc="seek">
+              <p:cTn id="2" dur="indefinite" nodeType="mainSeq">
+                <p:childTnLst>
+                  <p:par>
+                    <p:cTn id="3" fill="hold">
+                      <p:stCondLst>
+                        <p:cond delay="indefinite"/>
+                      </p:stCondLst>
+                      <p:childTnLst>
+                        <p:par>
+                          <p:cTn id="4" fill="hold">
+                            <p:stCondLst>
+                              <p:cond delay="0"/>
+                            </p:stCondLst>
+                            <p:childTnLst>
+                              <p:par>
+                                <p:cTn id="5" presetID="42" presetClass="entr" presetSubtype="0" fill="hold" grpId="0" nodeType="clickEffect">
+                                  <p:stCondLst>
+                                    <p:cond delay="0"/>
+                                  </p:stCondLst>
+                                  <p:childTnLst>
+                                    <p:set>
+                                      <p:cBhvr>
+                                        <p:cTn id="6" dur="1" fill="hold">
+                                          <p:stCondLst>
+                                            <p:cond delay="0"/>
+                                          </p:stCondLst>
+                                        </p:cTn>
+                                        <p:tgtEl>
+                                          <p:spTgt spid="3">
+                                            <p:txEl>
+                                              <p:pRg st="0" end="0"/>
+                                            </p:txEl>
+                                          </p:spTgt>
+                                        </p:tgtEl>
+                                        <p:attrNameLst>
+                                          <p:attrName>style.visibility</p:attrName>
+                                        </p:attrNameLst>
+                                      </p:cBhvr>
+                                      <p:to>
+                                        <p:strVal val="visible"/>
+                                      </p:to>
+                                    </p:set>
+                                    <p:animEffect transition="in" filter="fade">
+                                      <p:cBhvr>
+                                        <p:cTn id="7" dur="1000"/>
+                                        <p:tgtEl>
+                                          <p:spTgt spid="3">
+                                            <p:txEl>
+                                              <p:pRg st="0" end="0"/>
+                                            </p:txEl>
+                                          </p:spTgt>
+                                        </p:tgtEl>
+                                      </p:cBhvr>
+                                    </p:animEffect>
+                                    <p:anim calcmode="lin" valueType="num">
+                                      <p:cBhvr>
+                                        <p:cTn id="8" dur="1000" fill="hold"/>
+                                        <p:tgtEl>
+                                          <p:spTgt spid="3">
+                                            <p:txEl>
+                                              <p:pRg st="0" end="0"/>
+                                            </p:txEl>
+                                          </p:spTgt>
+                                        </p:tgtEl>
+                                        <p:attrNameLst>
+                                          <p:attrName>ppt_x</p:attrName>
+                                        </p:attrNameLst>
+                                      </p:cBhvr>
+                                      <p:tavLst>
+                                        <p:tav tm="0">
+                                          <p:val>
+                                            <p:strVal val="#ppt_x"/>
+                                          </p:val>
+                                        </p:tav>
+                                        <p:tav tm="100000">
+                                          <p:val>
+                                            <p:strVal val="#ppt_x"/>
+                                          </p:val>
+                                        </p:tav>
+                                      </p:tavLst>
+                                    </p:anim>
+                                    <p:anim calcmode="lin" valueType="num">
+                                      <p:cBhvr>
+                                        <p:cTn id="9" dur="1000" fill="hold"/>
+                                        <p:tgtEl>
+                                          <p:spTgt spid="3">
+                                            <p:txEl>
+                                              <p:pRg st="0" end="0"/>
+                                            </p:txEl>
+                                          </p:spTgt>
+                                        </p:tgtEl>
+                                        <p:attrNameLst>
+                                          <p:attrName>ppt_y</p:attrName>
+                                        </p:attrNameLst>
+                                      </p:cBhvr>
+                                      <p:tavLst>
+                                        <p:tav tm="0">
+                                          <p:val>
+                                            <p:strVal val="#ppt_y+.1"/>
+                                          </p:val>
+                                        </p:tav>
+                                        <p:tav tm="100000">
+                                          <p:val>
+                                            <p:strVal val="#ppt_y"/>
+                                          </p:val>
+                                        </p:tav>
+                                      </p:tavLst>
+                                    </p:anim>
+                                  </p:childTnLst>
+                                </p:cTn>
+                              </p:par>
+                            </p:childTnLst>
+                          </p:cTn>
+                        </p:par>
+                      </p:childTnLst>
+                    </p:cTn>
+                  </p:par>
+                </p:childTnLst>
+              </p:cTn>
+              <p:prevCondLst>
+                <p:cond evt="onPrev" delay="0">
+                  <p:tgtEl>
+                    <p:sldTgt/>
+                  </p:tgtEl>
+                </p:cond>
+              </p:prevCondLst>
+              <p:nextCondLst>
+                <p:cond evt="onNext" delay="0">
+                  <p:tgtEl>
+                    <p:sldTgt/>
+                  </p:tgtEl>
+                </p:cond>
+              </p:nextCondLst>
+            </p:seq>
+          </p:childTnLst>
+        </p:cTn>
+      </p:par>
+    </p:tnLst>
+    <p:bldLst>
+      <p:bldP spid="3" grpId="0" build="p"/>
+    </p:bldLst>
+  </p:timing>
 </p:sld>
 </file>
 
@@ -7378,7 +9108,7 @@
           <a:p>
             <a:r>
               <a:rPr lang="en-IN" b="1" dirty="0"/>
-              <a:t>Implementing Custom Endpoints</a:t>
+              <a:t>Securing HTTP Endpoints</a:t>
             </a:r>
             <a:endParaRPr lang="en-IN" dirty="0"/>
           </a:p>
@@ -7405,20 +9135,319 @@
           <a:bodyPr/>
           <a:lstStyle/>
           <a:p>
-            <a:endParaRPr lang="en-IN"/>
+            <a:pPr>
+              <a:buFont typeface="Wingdings" panose="05000000000000000000" pitchFamily="2" charset="2"/>
+              <a:buChar char="Ø"/>
+            </a:pPr>
+            <a:r>
+              <a:rPr lang="en-US" dirty="0"/>
+              <a:t>Securing HTTP endpoints in the same way that we do with any other sensitive URL</a:t>
+            </a:r>
+          </a:p>
+          <a:p>
+            <a:pPr>
+              <a:buFont typeface="Wingdings" panose="05000000000000000000" pitchFamily="2" charset="2"/>
+              <a:buChar char="Ø"/>
+            </a:pPr>
+            <a:r>
+              <a:rPr lang="en-US" dirty="0"/>
+              <a:t>If </a:t>
+            </a:r>
+            <a:r>
+              <a:rPr lang="en-US" i="1" dirty="0">
+                <a:solidFill>
+                  <a:srgbClr val="00B0F0"/>
+                </a:solidFill>
+              </a:rPr>
+              <a:t>spring-boot-starter-security </a:t>
+            </a:r>
+            <a:r>
+              <a:rPr lang="en-US" dirty="0"/>
+              <a:t>dependency is in the class path then all the endpoint except /health and /info are secured</a:t>
+            </a:r>
+          </a:p>
+          <a:p>
+            <a:pPr>
+              <a:buFont typeface="Wingdings" panose="05000000000000000000" pitchFamily="2" charset="2"/>
+              <a:buChar char="Ø"/>
+            </a:pPr>
+            <a:endParaRPr lang="en-IN" dirty="0"/>
           </a:p>
         </p:txBody>
       </p:sp>
     </p:spTree>
     <p:extLst>
       <p:ext uri="{BB962C8B-B14F-4D97-AF65-F5344CB8AC3E}">
-        <p14:creationId xmlns:p14="http://schemas.microsoft.com/office/powerpoint/2010/main" val="2645937587"/>
+        <p14:creationId xmlns:p14="http://schemas.microsoft.com/office/powerpoint/2010/main" val="1942379050"/>
       </p:ext>
     </p:extLst>
   </p:cSld>
   <p:clrMapOvr>
     <a:masterClrMapping/>
   </p:clrMapOvr>
+  <p:timing>
+    <p:tnLst>
+      <p:par>
+        <p:cTn id="1" dur="indefinite" restart="never" nodeType="tmRoot">
+          <p:childTnLst>
+            <p:seq concurrent="1" nextAc="seek">
+              <p:cTn id="2" dur="indefinite" nodeType="mainSeq">
+                <p:childTnLst>
+                  <p:par>
+                    <p:cTn id="3" fill="hold">
+                      <p:stCondLst>
+                        <p:cond delay="indefinite"/>
+                      </p:stCondLst>
+                      <p:childTnLst>
+                        <p:par>
+                          <p:cTn id="4" fill="hold">
+                            <p:stCondLst>
+                              <p:cond delay="0"/>
+                            </p:stCondLst>
+                            <p:childTnLst>
+                              <p:par>
+                                <p:cTn id="5" presetID="42" presetClass="entr" presetSubtype="0" fill="hold" grpId="0" nodeType="clickEffect">
+                                  <p:stCondLst>
+                                    <p:cond delay="0"/>
+                                  </p:stCondLst>
+                                  <p:childTnLst>
+                                    <p:set>
+                                      <p:cBhvr>
+                                        <p:cTn id="6" dur="1" fill="hold">
+                                          <p:stCondLst>
+                                            <p:cond delay="0"/>
+                                          </p:stCondLst>
+                                        </p:cTn>
+                                        <p:tgtEl>
+                                          <p:spTgt spid="3">
+                                            <p:txEl>
+                                              <p:pRg st="0" end="0"/>
+                                            </p:txEl>
+                                          </p:spTgt>
+                                        </p:tgtEl>
+                                        <p:attrNameLst>
+                                          <p:attrName>style.visibility</p:attrName>
+                                        </p:attrNameLst>
+                                      </p:cBhvr>
+                                      <p:to>
+                                        <p:strVal val="visible"/>
+                                      </p:to>
+                                    </p:set>
+                                    <p:animEffect transition="in" filter="fade">
+                                      <p:cBhvr>
+                                        <p:cTn id="7" dur="1000"/>
+                                        <p:tgtEl>
+                                          <p:spTgt spid="3">
+                                            <p:txEl>
+                                              <p:pRg st="0" end="0"/>
+                                            </p:txEl>
+                                          </p:spTgt>
+                                        </p:tgtEl>
+                                      </p:cBhvr>
+                                    </p:animEffect>
+                                    <p:anim calcmode="lin" valueType="num">
+                                      <p:cBhvr>
+                                        <p:cTn id="8" dur="1000" fill="hold"/>
+                                        <p:tgtEl>
+                                          <p:spTgt spid="3">
+                                            <p:txEl>
+                                              <p:pRg st="0" end="0"/>
+                                            </p:txEl>
+                                          </p:spTgt>
+                                        </p:tgtEl>
+                                        <p:attrNameLst>
+                                          <p:attrName>ppt_x</p:attrName>
+                                        </p:attrNameLst>
+                                      </p:cBhvr>
+                                      <p:tavLst>
+                                        <p:tav tm="0">
+                                          <p:val>
+                                            <p:strVal val="#ppt_x"/>
+                                          </p:val>
+                                        </p:tav>
+                                        <p:tav tm="100000">
+                                          <p:val>
+                                            <p:strVal val="#ppt_x"/>
+                                          </p:val>
+                                        </p:tav>
+                                      </p:tavLst>
+                                    </p:anim>
+                                    <p:anim calcmode="lin" valueType="num">
+                                      <p:cBhvr>
+                                        <p:cTn id="9" dur="1000" fill="hold"/>
+                                        <p:tgtEl>
+                                          <p:spTgt spid="3">
+                                            <p:txEl>
+                                              <p:pRg st="0" end="0"/>
+                                            </p:txEl>
+                                          </p:spTgt>
+                                        </p:tgtEl>
+                                        <p:attrNameLst>
+                                          <p:attrName>ppt_y</p:attrName>
+                                        </p:attrNameLst>
+                                      </p:cBhvr>
+                                      <p:tavLst>
+                                        <p:tav tm="0">
+                                          <p:val>
+                                            <p:strVal val="#ppt_y+.1"/>
+                                          </p:val>
+                                        </p:tav>
+                                        <p:tav tm="100000">
+                                          <p:val>
+                                            <p:strVal val="#ppt_y"/>
+                                          </p:val>
+                                        </p:tav>
+                                      </p:tavLst>
+                                    </p:anim>
+                                  </p:childTnLst>
+                                </p:cTn>
+                              </p:par>
+                            </p:childTnLst>
+                          </p:cTn>
+                        </p:par>
+                      </p:childTnLst>
+                    </p:cTn>
+                  </p:par>
+                  <p:par>
+                    <p:cTn id="10" fill="hold">
+                      <p:stCondLst>
+                        <p:cond delay="indefinite"/>
+                      </p:stCondLst>
+                      <p:childTnLst>
+                        <p:par>
+                          <p:cTn id="11" fill="hold">
+                            <p:stCondLst>
+                              <p:cond delay="0"/>
+                            </p:stCondLst>
+                            <p:childTnLst>
+                              <p:par>
+                                <p:cTn id="12" presetID="42" presetClass="entr" presetSubtype="0" fill="hold" grpId="0" nodeType="clickEffect">
+                                  <p:stCondLst>
+                                    <p:cond delay="0"/>
+                                  </p:stCondLst>
+                                  <p:childTnLst>
+                                    <p:set>
+                                      <p:cBhvr>
+                                        <p:cTn id="13" dur="1" fill="hold">
+                                          <p:stCondLst>
+                                            <p:cond delay="0"/>
+                                          </p:stCondLst>
+                                        </p:cTn>
+                                        <p:tgtEl>
+                                          <p:spTgt spid="3">
+                                            <p:txEl>
+                                              <p:pRg st="1" end="1"/>
+                                            </p:txEl>
+                                          </p:spTgt>
+                                        </p:tgtEl>
+                                        <p:attrNameLst>
+                                          <p:attrName>style.visibility</p:attrName>
+                                        </p:attrNameLst>
+                                      </p:cBhvr>
+                                      <p:to>
+                                        <p:strVal val="visible"/>
+                                      </p:to>
+                                    </p:set>
+                                    <p:animEffect transition="in" filter="fade">
+                                      <p:cBhvr>
+                                        <p:cTn id="14" dur="1000"/>
+                                        <p:tgtEl>
+                                          <p:spTgt spid="3">
+                                            <p:txEl>
+                                              <p:pRg st="1" end="1"/>
+                                            </p:txEl>
+                                          </p:spTgt>
+                                        </p:tgtEl>
+                                      </p:cBhvr>
+                                    </p:animEffect>
+                                    <p:anim calcmode="lin" valueType="num">
+                                      <p:cBhvr>
+                                        <p:cTn id="15" dur="1000" fill="hold"/>
+                                        <p:tgtEl>
+                                          <p:spTgt spid="3">
+                                            <p:txEl>
+                                              <p:pRg st="1" end="1"/>
+                                            </p:txEl>
+                                          </p:spTgt>
+                                        </p:tgtEl>
+                                        <p:attrNameLst>
+                                          <p:attrName>ppt_x</p:attrName>
+                                        </p:attrNameLst>
+                                      </p:cBhvr>
+                                      <p:tavLst>
+                                        <p:tav tm="0">
+                                          <p:val>
+                                            <p:strVal val="#ppt_x"/>
+                                          </p:val>
+                                        </p:tav>
+                                        <p:tav tm="100000">
+                                          <p:val>
+                                            <p:strVal val="#ppt_x"/>
+                                          </p:val>
+                                        </p:tav>
+                                      </p:tavLst>
+                                    </p:anim>
+                                    <p:anim calcmode="lin" valueType="num">
+                                      <p:cBhvr>
+                                        <p:cTn id="16" dur="1000" fill="hold"/>
+                                        <p:tgtEl>
+                                          <p:spTgt spid="3">
+                                            <p:txEl>
+                                              <p:pRg st="1" end="1"/>
+                                            </p:txEl>
+                                          </p:spTgt>
+                                        </p:tgtEl>
+                                        <p:attrNameLst>
+                                          <p:attrName>ppt_y</p:attrName>
+                                        </p:attrNameLst>
+                                      </p:cBhvr>
+                                      <p:tavLst>
+                                        <p:tav tm="0">
+                                          <p:val>
+                                            <p:strVal val="#ppt_y+.1"/>
+                                          </p:val>
+                                        </p:tav>
+                                        <p:tav tm="100000">
+                                          <p:val>
+                                            <p:strVal val="#ppt_y"/>
+                                          </p:val>
+                                        </p:tav>
+                                      </p:tavLst>
+                                    </p:anim>
+                                  </p:childTnLst>
+                                </p:cTn>
+                              </p:par>
+                            </p:childTnLst>
+                          </p:cTn>
+                        </p:par>
+                      </p:childTnLst>
+                    </p:cTn>
+                  </p:par>
+                </p:childTnLst>
+              </p:cTn>
+              <p:prevCondLst>
+                <p:cond evt="onPrev" delay="0">
+                  <p:tgtEl>
+                    <p:sldTgt/>
+                  </p:tgtEl>
+                </p:cond>
+              </p:prevCondLst>
+              <p:nextCondLst>
+                <p:cond evt="onNext" delay="0">
+                  <p:tgtEl>
+                    <p:sldTgt/>
+                  </p:tgtEl>
+                </p:cond>
+              </p:nextCondLst>
+            </p:seq>
+          </p:childTnLst>
+        </p:cTn>
+      </p:par>
+    </p:tnLst>
+    <p:bldLst>
+      <p:bldP spid="3" grpId="0" build="p"/>
+    </p:bldLst>
+  </p:timing>
 </p:sld>
 </file>
 

</xml_diff>

<commit_message>
adding custom endpoint and security related code
</commit_message>
<xml_diff>
--- a/ppt/Spring boot actuator.pptx
+++ b/ppt/Spring boot actuator.pptx
@@ -14,7 +14,7 @@
     <p:sldId id="263" r:id="rId8"/>
     <p:sldId id="265" r:id="rId9"/>
     <p:sldId id="260" r:id="rId10"/>
-    <p:sldId id="264" r:id="rId11"/>
+    <p:sldId id="267" r:id="rId11"/>
   </p:sldIdLst>
   <p:sldSz cx="12192000" cy="6858000"/>
   <p:notesSz cx="6858000" cy="9144000"/>
@@ -4164,7 +4164,7 @@
           <p:cNvPr id="2" name="Title 1">
             <a:extLst>
               <a:ext uri="{FF2B5EF4-FFF2-40B4-BE49-F238E27FC236}">
-                <a16:creationId xmlns:a16="http://schemas.microsoft.com/office/drawing/2014/main" id="{DAFACA3E-550E-41D1-86AA-051CCB4AAC9A}"/>
+                <a16:creationId xmlns:a16="http://schemas.microsoft.com/office/drawing/2014/main" id="{BBCBEA67-0487-4841-9DF8-1087E32FD817}"/>
               </a:ext>
             </a:extLst>
           </p:cNvPr>
@@ -4175,12 +4175,41 @@
             <p:ph type="title"/>
           </p:nvPr>
         </p:nvSpPr>
-        <p:spPr/>
+        <p:spPr>
+          <a:solidFill>
+            <a:srgbClr val="92D050"/>
+          </a:solidFill>
+          <a:ln>
+            <a:noFill/>
+          </a:ln>
+          <a:effectLst>
+            <a:outerShdw blurRad="149987" dist="250190" dir="8460000" algn="ctr">
+              <a:srgbClr val="000000">
+                <a:alpha val="28000"/>
+              </a:srgbClr>
+            </a:outerShdw>
+          </a:effectLst>
+          <a:scene3d>
+            <a:camera prst="orthographicFront">
+              <a:rot lat="0" lon="0" rev="0"/>
+            </a:camera>
+            <a:lightRig rig="contrasting" dir="t">
+              <a:rot lat="0" lon="0" rev="1500000"/>
+            </a:lightRig>
+          </a:scene3d>
+          <a:sp3d prstMaterial="metal">
+            <a:bevelT w="88900" h="88900"/>
+          </a:sp3d>
+        </p:spPr>
         <p:txBody>
           <a:bodyPr/>
           <a:lstStyle/>
           <a:p>
-            <a:endParaRPr lang="en-IN"/>
+            <a:r>
+              <a:rPr lang="en-IN" b="1" dirty="0"/>
+              <a:t>References</a:t>
+            </a:r>
+            <a:endParaRPr lang="en-IN" dirty="0"/>
           </a:p>
         </p:txBody>
       </p:sp>
@@ -4189,7 +4218,7 @@
           <p:cNvPr id="3" name="Content Placeholder 2">
             <a:extLst>
               <a:ext uri="{FF2B5EF4-FFF2-40B4-BE49-F238E27FC236}">
-                <a16:creationId xmlns:a16="http://schemas.microsoft.com/office/drawing/2014/main" id="{4794D233-BE68-4F4E-822D-2043477D942E}"/>
+                <a16:creationId xmlns:a16="http://schemas.microsoft.com/office/drawing/2014/main" id="{3F44392C-7362-4AC3-921F-137FB77127DB}"/>
               </a:ext>
             </a:extLst>
           </p:cNvPr>
@@ -4205,20 +4234,178 @@
           <a:bodyPr/>
           <a:lstStyle/>
           <a:p>
-            <a:endParaRPr lang="en-IN"/>
+            <a:pPr>
+              <a:buFont typeface="Wingdings" panose="05000000000000000000" pitchFamily="2" charset="2"/>
+              <a:buChar char="Ø"/>
+            </a:pPr>
+            <a:r>
+              <a:rPr lang="en-IN" dirty="0">
+                <a:hlinkClick r:id="rId2"/>
+              </a:rPr>
+              <a:t>https://docs.spring.io/spring-boot/docs/current/reference/html/production-ready-endpoints.html</a:t>
+            </a:r>
+            <a:endParaRPr lang="en-IN" dirty="0"/>
           </a:p>
         </p:txBody>
       </p:sp>
     </p:spTree>
     <p:extLst>
       <p:ext uri="{BB962C8B-B14F-4D97-AF65-F5344CB8AC3E}">
-        <p14:creationId xmlns:p14="http://schemas.microsoft.com/office/powerpoint/2010/main" val="1837185487"/>
+        <p14:creationId xmlns:p14="http://schemas.microsoft.com/office/powerpoint/2010/main" val="1689630452"/>
       </p:ext>
     </p:extLst>
   </p:cSld>
   <p:clrMapOvr>
     <a:masterClrMapping/>
   </p:clrMapOvr>
+  <p:timing>
+    <p:tnLst>
+      <p:par>
+        <p:cTn id="1" dur="indefinite" restart="never" nodeType="tmRoot">
+          <p:childTnLst>
+            <p:seq concurrent="1" nextAc="seek">
+              <p:cTn id="2" dur="indefinite" nodeType="mainSeq">
+                <p:childTnLst>
+                  <p:par>
+                    <p:cTn id="3" fill="hold">
+                      <p:stCondLst>
+                        <p:cond delay="indefinite"/>
+                      </p:stCondLst>
+                      <p:childTnLst>
+                        <p:par>
+                          <p:cTn id="4" fill="hold">
+                            <p:stCondLst>
+                              <p:cond delay="0"/>
+                            </p:stCondLst>
+                            <p:childTnLst>
+                              <p:par>
+                                <p:cTn id="5" presetID="42" presetClass="entr" presetSubtype="0" fill="hold" grpId="0" nodeType="clickEffect">
+                                  <p:stCondLst>
+                                    <p:cond delay="0"/>
+                                  </p:stCondLst>
+                                  <p:childTnLst>
+                                    <p:set>
+                                      <p:cBhvr>
+                                        <p:cTn id="6" dur="1" fill="hold">
+                                          <p:stCondLst>
+                                            <p:cond delay="0"/>
+                                          </p:stCondLst>
+                                        </p:cTn>
+                                        <p:tgtEl>
+                                          <p:spTgt spid="3">
+                                            <p:txEl>
+                                              <p:pRg st="0" end="0"/>
+                                            </p:txEl>
+                                          </p:spTgt>
+                                        </p:tgtEl>
+                                        <p:attrNameLst>
+                                          <p:attrName>style.visibility</p:attrName>
+                                        </p:attrNameLst>
+                                      </p:cBhvr>
+                                      <p:to>
+                                        <p:strVal val="visible"/>
+                                      </p:to>
+                                    </p:set>
+                                    <p:animEffect transition="in" filter="fade">
+                                      <p:cBhvr>
+                                        <p:cTn id="7" dur="1000"/>
+                                        <p:tgtEl>
+                                          <p:spTgt spid="3">
+                                            <p:txEl>
+                                              <p:pRg st="0" end="0"/>
+                                            </p:txEl>
+                                          </p:spTgt>
+                                        </p:tgtEl>
+                                      </p:cBhvr>
+                                    </p:animEffect>
+                                    <p:anim calcmode="lin" valueType="num">
+                                      <p:cBhvr>
+                                        <p:cTn id="8" dur="1000" fill="hold"/>
+                                        <p:tgtEl>
+                                          <p:spTgt spid="3">
+                                            <p:txEl>
+                                              <p:pRg st="0" end="0"/>
+                                            </p:txEl>
+                                          </p:spTgt>
+                                        </p:tgtEl>
+                                        <p:attrNameLst>
+                                          <p:attrName>ppt_x</p:attrName>
+                                        </p:attrNameLst>
+                                      </p:cBhvr>
+                                      <p:tavLst>
+                                        <p:tav tm="0">
+                                          <p:val>
+                                            <p:strVal val="#ppt_x"/>
+                                          </p:val>
+                                        </p:tav>
+                                        <p:tav tm="100000">
+                                          <p:val>
+                                            <p:strVal val="#ppt_x"/>
+                                          </p:val>
+                                        </p:tav>
+                                      </p:tavLst>
+                                    </p:anim>
+                                    <p:anim calcmode="lin" valueType="num">
+                                      <p:cBhvr>
+                                        <p:cTn id="9" dur="1000" fill="hold"/>
+                                        <p:tgtEl>
+                                          <p:spTgt spid="3">
+                                            <p:txEl>
+                                              <p:pRg st="0" end="0"/>
+                                            </p:txEl>
+                                          </p:spTgt>
+                                        </p:tgtEl>
+                                        <p:attrNameLst>
+                                          <p:attrName>ppt_y</p:attrName>
+                                        </p:attrNameLst>
+                                      </p:cBhvr>
+                                      <p:tavLst>
+                                        <p:tav tm="0">
+                                          <p:val>
+                                            <p:strVal val="#ppt_y+.1"/>
+                                          </p:val>
+                                        </p:tav>
+                                        <p:tav tm="100000">
+                                          <p:val>
+                                            <p:strVal val="#ppt_y"/>
+                                          </p:val>
+                                        </p:tav>
+                                      </p:tavLst>
+                                    </p:anim>
+                                  </p:childTnLst>
+                                </p:cTn>
+                              </p:par>
+                            </p:childTnLst>
+                          </p:cTn>
+                        </p:par>
+                      </p:childTnLst>
+                    </p:cTn>
+                  </p:par>
+                </p:childTnLst>
+              </p:cTn>
+              <p:prevCondLst>
+                <p:cond evt="onPrev" delay="0">
+                  <p:tgtEl>
+                    <p:sldTgt/>
+                  </p:tgtEl>
+                </p:cond>
+              </p:prevCondLst>
+              <p:nextCondLst>
+                <p:cond evt="onNext" delay="0">
+                  <p:tgtEl>
+                    <p:sldTgt/>
+                  </p:tgtEl>
+                </p:cond>
+              </p:nextCondLst>
+            </p:seq>
+          </p:childTnLst>
+        </p:cTn>
+      </p:par>
+    </p:tnLst>
+    <p:bldLst>
+      <p:bldP spid="3" grpId="0" build="p"/>
+    </p:bldLst>
+  </p:timing>
 </p:sld>
 </file>
 
@@ -8754,7 +8941,32 @@
           <a:bodyPr/>
           <a:lstStyle/>
           <a:p>
-            <a:endParaRPr lang="en-IN"/>
+            <a:pPr>
+              <a:buFont typeface="Wingdings" panose="05000000000000000000" pitchFamily="2" charset="2"/>
+              <a:buChar char="Ø"/>
+            </a:pPr>
+            <a:r>
+              <a:rPr lang="en-IN" dirty="0"/>
+              <a:t>Using </a:t>
+            </a:r>
+            <a:r>
+              <a:rPr lang="en-IN" dirty="0">
+                <a:solidFill>
+                  <a:srgbClr val="00B0F0"/>
+                </a:solidFill>
+              </a:rPr>
+              <a:t>@Endpoint</a:t>
+            </a:r>
+          </a:p>
+          <a:p>
+            <a:pPr>
+              <a:buFont typeface="Wingdings" panose="05000000000000000000" pitchFamily="2" charset="2"/>
+              <a:buChar char="Ø"/>
+            </a:pPr>
+            <a:r>
+              <a:rPr lang="en-IN" dirty="0"/>
+              <a:t>Rest controller Endpoint</a:t>
+            </a:r>
           </a:p>
         </p:txBody>
       </p:sp>
@@ -8768,6 +8980,269 @@
   <p:clrMapOvr>
     <a:masterClrMapping/>
   </p:clrMapOvr>
+  <p:timing>
+    <p:tnLst>
+      <p:par>
+        <p:cTn id="1" dur="indefinite" restart="never" nodeType="tmRoot">
+          <p:childTnLst>
+            <p:seq concurrent="1" nextAc="seek">
+              <p:cTn id="2" dur="indefinite" nodeType="mainSeq">
+                <p:childTnLst>
+                  <p:par>
+                    <p:cTn id="3" fill="hold">
+                      <p:stCondLst>
+                        <p:cond delay="indefinite"/>
+                      </p:stCondLst>
+                      <p:childTnLst>
+                        <p:par>
+                          <p:cTn id="4" fill="hold">
+                            <p:stCondLst>
+                              <p:cond delay="0"/>
+                            </p:stCondLst>
+                            <p:childTnLst>
+                              <p:par>
+                                <p:cTn id="5" presetID="42" presetClass="entr" presetSubtype="0" fill="hold" grpId="0" nodeType="clickEffect">
+                                  <p:stCondLst>
+                                    <p:cond delay="0"/>
+                                  </p:stCondLst>
+                                  <p:childTnLst>
+                                    <p:set>
+                                      <p:cBhvr>
+                                        <p:cTn id="6" dur="1" fill="hold">
+                                          <p:stCondLst>
+                                            <p:cond delay="0"/>
+                                          </p:stCondLst>
+                                        </p:cTn>
+                                        <p:tgtEl>
+                                          <p:spTgt spid="3">
+                                            <p:txEl>
+                                              <p:pRg st="0" end="0"/>
+                                            </p:txEl>
+                                          </p:spTgt>
+                                        </p:tgtEl>
+                                        <p:attrNameLst>
+                                          <p:attrName>style.visibility</p:attrName>
+                                        </p:attrNameLst>
+                                      </p:cBhvr>
+                                      <p:to>
+                                        <p:strVal val="visible"/>
+                                      </p:to>
+                                    </p:set>
+                                    <p:animEffect transition="in" filter="fade">
+                                      <p:cBhvr>
+                                        <p:cTn id="7" dur="1000"/>
+                                        <p:tgtEl>
+                                          <p:spTgt spid="3">
+                                            <p:txEl>
+                                              <p:pRg st="0" end="0"/>
+                                            </p:txEl>
+                                          </p:spTgt>
+                                        </p:tgtEl>
+                                      </p:cBhvr>
+                                    </p:animEffect>
+                                    <p:anim calcmode="lin" valueType="num">
+                                      <p:cBhvr>
+                                        <p:cTn id="8" dur="1000" fill="hold"/>
+                                        <p:tgtEl>
+                                          <p:spTgt spid="3">
+                                            <p:txEl>
+                                              <p:pRg st="0" end="0"/>
+                                            </p:txEl>
+                                          </p:spTgt>
+                                        </p:tgtEl>
+                                        <p:attrNameLst>
+                                          <p:attrName>ppt_x</p:attrName>
+                                        </p:attrNameLst>
+                                      </p:cBhvr>
+                                      <p:tavLst>
+                                        <p:tav tm="0">
+                                          <p:val>
+                                            <p:strVal val="#ppt_x"/>
+                                          </p:val>
+                                        </p:tav>
+                                        <p:tav tm="100000">
+                                          <p:val>
+                                            <p:strVal val="#ppt_x"/>
+                                          </p:val>
+                                        </p:tav>
+                                      </p:tavLst>
+                                    </p:anim>
+                                    <p:anim calcmode="lin" valueType="num">
+                                      <p:cBhvr>
+                                        <p:cTn id="9" dur="1000" fill="hold"/>
+                                        <p:tgtEl>
+                                          <p:spTgt spid="3">
+                                            <p:txEl>
+                                              <p:pRg st="0" end="0"/>
+                                            </p:txEl>
+                                          </p:spTgt>
+                                        </p:tgtEl>
+                                        <p:attrNameLst>
+                                          <p:attrName>ppt_y</p:attrName>
+                                        </p:attrNameLst>
+                                      </p:cBhvr>
+                                      <p:tavLst>
+                                        <p:tav tm="0">
+                                          <p:val>
+                                            <p:strVal val="#ppt_y+.1"/>
+                                          </p:val>
+                                        </p:tav>
+                                        <p:tav tm="100000">
+                                          <p:val>
+                                            <p:strVal val="#ppt_y"/>
+                                          </p:val>
+                                        </p:tav>
+                                      </p:tavLst>
+                                    </p:anim>
+                                  </p:childTnLst>
+                                </p:cTn>
+                              </p:par>
+                            </p:childTnLst>
+                          </p:cTn>
+                        </p:par>
+                      </p:childTnLst>
+                    </p:cTn>
+                  </p:par>
+                  <p:par>
+                    <p:cTn id="10" fill="hold">
+                      <p:stCondLst>
+                        <p:cond delay="indefinite"/>
+                      </p:stCondLst>
+                      <p:childTnLst>
+                        <p:par>
+                          <p:cTn id="11" fill="hold">
+                            <p:stCondLst>
+                              <p:cond delay="0"/>
+                            </p:stCondLst>
+                            <p:childTnLst>
+                              <p:par>
+                                <p:cTn id="12" presetID="42" presetClass="entr" presetSubtype="0" fill="hold" grpId="0" nodeType="clickEffect">
+                                  <p:stCondLst>
+                                    <p:cond delay="0"/>
+                                  </p:stCondLst>
+                                  <p:childTnLst>
+                                    <p:set>
+                                      <p:cBhvr>
+                                        <p:cTn id="13" dur="1" fill="hold">
+                                          <p:stCondLst>
+                                            <p:cond delay="0"/>
+                                          </p:stCondLst>
+                                        </p:cTn>
+                                        <p:tgtEl>
+                                          <p:spTgt spid="3">
+                                            <p:txEl>
+                                              <p:pRg st="1" end="1"/>
+                                            </p:txEl>
+                                          </p:spTgt>
+                                        </p:tgtEl>
+                                        <p:attrNameLst>
+                                          <p:attrName>style.visibility</p:attrName>
+                                        </p:attrNameLst>
+                                      </p:cBhvr>
+                                      <p:to>
+                                        <p:strVal val="visible"/>
+                                      </p:to>
+                                    </p:set>
+                                    <p:animEffect transition="in" filter="fade">
+                                      <p:cBhvr>
+                                        <p:cTn id="14" dur="1000"/>
+                                        <p:tgtEl>
+                                          <p:spTgt spid="3">
+                                            <p:txEl>
+                                              <p:pRg st="1" end="1"/>
+                                            </p:txEl>
+                                          </p:spTgt>
+                                        </p:tgtEl>
+                                      </p:cBhvr>
+                                    </p:animEffect>
+                                    <p:anim calcmode="lin" valueType="num">
+                                      <p:cBhvr>
+                                        <p:cTn id="15" dur="1000" fill="hold"/>
+                                        <p:tgtEl>
+                                          <p:spTgt spid="3">
+                                            <p:txEl>
+                                              <p:pRg st="1" end="1"/>
+                                            </p:txEl>
+                                          </p:spTgt>
+                                        </p:tgtEl>
+                                        <p:attrNameLst>
+                                          <p:attrName>ppt_x</p:attrName>
+                                        </p:attrNameLst>
+                                      </p:cBhvr>
+                                      <p:tavLst>
+                                        <p:tav tm="0">
+                                          <p:val>
+                                            <p:strVal val="#ppt_x"/>
+                                          </p:val>
+                                        </p:tav>
+                                        <p:tav tm="100000">
+                                          <p:val>
+                                            <p:strVal val="#ppt_x"/>
+                                          </p:val>
+                                        </p:tav>
+                                      </p:tavLst>
+                                    </p:anim>
+                                    <p:anim calcmode="lin" valueType="num">
+                                      <p:cBhvr>
+                                        <p:cTn id="16" dur="1000" fill="hold"/>
+                                        <p:tgtEl>
+                                          <p:spTgt spid="3">
+                                            <p:txEl>
+                                              <p:pRg st="1" end="1"/>
+                                            </p:txEl>
+                                          </p:spTgt>
+                                        </p:tgtEl>
+                                        <p:attrNameLst>
+                                          <p:attrName>ppt_y</p:attrName>
+                                        </p:attrNameLst>
+                                      </p:cBhvr>
+                                      <p:tavLst>
+                                        <p:tav tm="0">
+                                          <p:val>
+                                            <p:strVal val="#ppt_y+.1"/>
+                                          </p:val>
+                                        </p:tav>
+                                        <p:tav tm="100000">
+                                          <p:val>
+                                            <p:strVal val="#ppt_y"/>
+                                          </p:val>
+                                        </p:tav>
+                                      </p:tavLst>
+                                    </p:anim>
+                                  </p:childTnLst>
+                                </p:cTn>
+                              </p:par>
+                            </p:childTnLst>
+                          </p:cTn>
+                        </p:par>
+                      </p:childTnLst>
+                    </p:cTn>
+                  </p:par>
+                </p:childTnLst>
+              </p:cTn>
+              <p:prevCondLst>
+                <p:cond evt="onPrev" delay="0">
+                  <p:tgtEl>
+                    <p:sldTgt/>
+                  </p:tgtEl>
+                </p:cond>
+              </p:prevCondLst>
+              <p:nextCondLst>
+                <p:cond evt="onNext" delay="0">
+                  <p:tgtEl>
+                    <p:sldTgt/>
+                  </p:tgtEl>
+                </p:cond>
+              </p:nextCondLst>
+            </p:seq>
+          </p:childTnLst>
+        </p:cTn>
+      </p:par>
+    </p:tnLst>
+    <p:bldLst>
+      <p:bldP spid="3" grpId="0" build="p"/>
+    </p:bldLst>
+  </p:timing>
 </p:sld>
 </file>
 
@@ -8869,7 +9344,7 @@
             </a:pPr>
             <a:r>
               <a:rPr lang="en-IN" dirty="0"/>
-              <a:t>implement the </a:t>
+              <a:t>By Implement the </a:t>
             </a:r>
             <a:r>
               <a:rPr lang="en-IN" dirty="0" err="1"/>
@@ -8879,6 +9354,97 @@
               <a:rPr lang="en-IN" dirty="0"/>
               <a:t> interface.</a:t>
             </a:r>
+          </a:p>
+          <a:p>
+            <a:pPr>
+              <a:buFont typeface="Wingdings" panose="05000000000000000000" pitchFamily="2" charset="2"/>
+              <a:buChar char="Ø"/>
+            </a:pPr>
+            <a:r>
+              <a:rPr lang="en-IN" dirty="0"/>
+              <a:t>Auto-configured </a:t>
+            </a:r>
+            <a:r>
+              <a:rPr lang="en-IN" dirty="0" err="1"/>
+              <a:t>HealthIndicators</a:t>
+            </a:r>
+            <a:endParaRPr lang="en-IN" dirty="0"/>
+          </a:p>
+          <a:p>
+            <a:pPr lvl="1">
+              <a:buFont typeface="Wingdings" panose="05000000000000000000" pitchFamily="2" charset="2"/>
+              <a:buChar char="Ø"/>
+            </a:pPr>
+            <a:r>
+              <a:rPr lang="en-US" dirty="0" err="1"/>
+              <a:t>CassandraHealthIndicator</a:t>
+            </a:r>
+            <a:r>
+              <a:rPr lang="en-US" dirty="0"/>
+              <a:t>  --  Checks that a Cassandra database is up.</a:t>
+            </a:r>
+          </a:p>
+          <a:p>
+            <a:pPr lvl="1">
+              <a:buFont typeface="Wingdings" panose="05000000000000000000" pitchFamily="2" charset="2"/>
+              <a:buChar char="Ø"/>
+            </a:pPr>
+            <a:r>
+              <a:rPr lang="en-US" dirty="0" err="1"/>
+              <a:t>CouchbaseHealthIndicator</a:t>
+            </a:r>
+            <a:r>
+              <a:rPr lang="en-US" dirty="0"/>
+              <a:t>  --  Checks that a Couchbase cluster is up.</a:t>
+            </a:r>
+          </a:p>
+          <a:p>
+            <a:pPr lvl="1">
+              <a:buFont typeface="Wingdings" panose="05000000000000000000" pitchFamily="2" charset="2"/>
+              <a:buChar char="Ø"/>
+            </a:pPr>
+            <a:r>
+              <a:rPr lang="en-US" dirty="0" err="1"/>
+              <a:t>DiskSpaceHealthIndicator</a:t>
+            </a:r>
+            <a:r>
+              <a:rPr lang="en-US" dirty="0"/>
+              <a:t>  -- Checks for low disk space.</a:t>
+            </a:r>
+            <a:endParaRPr lang="en-IN" dirty="0"/>
+          </a:p>
+          <a:p>
+            <a:pPr>
+              <a:buFont typeface="Wingdings" panose="05000000000000000000" pitchFamily="2" charset="2"/>
+              <a:buChar char="Ø"/>
+            </a:pPr>
+            <a:r>
+              <a:rPr lang="en-IN" i="1" dirty="0" err="1">
+                <a:solidFill>
+                  <a:srgbClr val="00B0F0"/>
+                </a:solidFill>
+              </a:rPr>
+              <a:t>management.health.defaults.enabled</a:t>
+            </a:r>
+            <a:r>
+              <a:rPr lang="en-IN" i="1" dirty="0">
+                <a:solidFill>
+                  <a:srgbClr val="00B0F0"/>
+                </a:solidFill>
+              </a:rPr>
+              <a:t>=true/false</a:t>
+            </a:r>
+            <a:r>
+              <a:rPr lang="en-IN" dirty="0"/>
+              <a:t> can be used to control all health indicators</a:t>
+            </a:r>
+          </a:p>
+          <a:p>
+            <a:pPr>
+              <a:buFont typeface="Wingdings" panose="05000000000000000000" pitchFamily="2" charset="2"/>
+              <a:buChar char="Ø"/>
+            </a:pPr>
+            <a:endParaRPr lang="en-IN" dirty="0"/>
           </a:p>
         </p:txBody>
       </p:sp>
@@ -8986,6 +9552,527 @@
                                           <p:spTgt spid="3">
                                             <p:txEl>
                                               <p:pRg st="0" end="0"/>
+                                            </p:txEl>
+                                          </p:spTgt>
+                                        </p:tgtEl>
+                                        <p:attrNameLst>
+                                          <p:attrName>ppt_y</p:attrName>
+                                        </p:attrNameLst>
+                                      </p:cBhvr>
+                                      <p:tavLst>
+                                        <p:tav tm="0">
+                                          <p:val>
+                                            <p:strVal val="#ppt_y+.1"/>
+                                          </p:val>
+                                        </p:tav>
+                                        <p:tav tm="100000">
+                                          <p:val>
+                                            <p:strVal val="#ppt_y"/>
+                                          </p:val>
+                                        </p:tav>
+                                      </p:tavLst>
+                                    </p:anim>
+                                  </p:childTnLst>
+                                </p:cTn>
+                              </p:par>
+                            </p:childTnLst>
+                          </p:cTn>
+                        </p:par>
+                      </p:childTnLst>
+                    </p:cTn>
+                  </p:par>
+                  <p:par>
+                    <p:cTn id="10" fill="hold">
+                      <p:stCondLst>
+                        <p:cond delay="indefinite"/>
+                      </p:stCondLst>
+                      <p:childTnLst>
+                        <p:par>
+                          <p:cTn id="11" fill="hold">
+                            <p:stCondLst>
+                              <p:cond delay="0"/>
+                            </p:stCondLst>
+                            <p:childTnLst>
+                              <p:par>
+                                <p:cTn id="12" presetID="42" presetClass="entr" presetSubtype="0" fill="hold" grpId="0" nodeType="clickEffect">
+                                  <p:stCondLst>
+                                    <p:cond delay="0"/>
+                                  </p:stCondLst>
+                                  <p:childTnLst>
+                                    <p:set>
+                                      <p:cBhvr>
+                                        <p:cTn id="13" dur="1" fill="hold">
+                                          <p:stCondLst>
+                                            <p:cond delay="0"/>
+                                          </p:stCondLst>
+                                        </p:cTn>
+                                        <p:tgtEl>
+                                          <p:spTgt spid="3">
+                                            <p:txEl>
+                                              <p:pRg st="1" end="1"/>
+                                            </p:txEl>
+                                          </p:spTgt>
+                                        </p:tgtEl>
+                                        <p:attrNameLst>
+                                          <p:attrName>style.visibility</p:attrName>
+                                        </p:attrNameLst>
+                                      </p:cBhvr>
+                                      <p:to>
+                                        <p:strVal val="visible"/>
+                                      </p:to>
+                                    </p:set>
+                                    <p:animEffect transition="in" filter="fade">
+                                      <p:cBhvr>
+                                        <p:cTn id="14" dur="1000"/>
+                                        <p:tgtEl>
+                                          <p:spTgt spid="3">
+                                            <p:txEl>
+                                              <p:pRg st="1" end="1"/>
+                                            </p:txEl>
+                                          </p:spTgt>
+                                        </p:tgtEl>
+                                      </p:cBhvr>
+                                    </p:animEffect>
+                                    <p:anim calcmode="lin" valueType="num">
+                                      <p:cBhvr>
+                                        <p:cTn id="15" dur="1000" fill="hold"/>
+                                        <p:tgtEl>
+                                          <p:spTgt spid="3">
+                                            <p:txEl>
+                                              <p:pRg st="1" end="1"/>
+                                            </p:txEl>
+                                          </p:spTgt>
+                                        </p:tgtEl>
+                                        <p:attrNameLst>
+                                          <p:attrName>ppt_x</p:attrName>
+                                        </p:attrNameLst>
+                                      </p:cBhvr>
+                                      <p:tavLst>
+                                        <p:tav tm="0">
+                                          <p:val>
+                                            <p:strVal val="#ppt_x"/>
+                                          </p:val>
+                                        </p:tav>
+                                        <p:tav tm="100000">
+                                          <p:val>
+                                            <p:strVal val="#ppt_x"/>
+                                          </p:val>
+                                        </p:tav>
+                                      </p:tavLst>
+                                    </p:anim>
+                                    <p:anim calcmode="lin" valueType="num">
+                                      <p:cBhvr>
+                                        <p:cTn id="16" dur="1000" fill="hold"/>
+                                        <p:tgtEl>
+                                          <p:spTgt spid="3">
+                                            <p:txEl>
+                                              <p:pRg st="1" end="1"/>
+                                            </p:txEl>
+                                          </p:spTgt>
+                                        </p:tgtEl>
+                                        <p:attrNameLst>
+                                          <p:attrName>ppt_y</p:attrName>
+                                        </p:attrNameLst>
+                                      </p:cBhvr>
+                                      <p:tavLst>
+                                        <p:tav tm="0">
+                                          <p:val>
+                                            <p:strVal val="#ppt_y+.1"/>
+                                          </p:val>
+                                        </p:tav>
+                                        <p:tav tm="100000">
+                                          <p:val>
+                                            <p:strVal val="#ppt_y"/>
+                                          </p:val>
+                                        </p:tav>
+                                      </p:tavLst>
+                                    </p:anim>
+                                  </p:childTnLst>
+                                </p:cTn>
+                              </p:par>
+                              <p:par>
+                                <p:cTn id="17" presetID="42" presetClass="entr" presetSubtype="0" fill="hold" grpId="0" nodeType="withEffect">
+                                  <p:stCondLst>
+                                    <p:cond delay="0"/>
+                                  </p:stCondLst>
+                                  <p:childTnLst>
+                                    <p:set>
+                                      <p:cBhvr>
+                                        <p:cTn id="18" dur="1" fill="hold">
+                                          <p:stCondLst>
+                                            <p:cond delay="0"/>
+                                          </p:stCondLst>
+                                        </p:cTn>
+                                        <p:tgtEl>
+                                          <p:spTgt spid="3">
+                                            <p:txEl>
+                                              <p:pRg st="2" end="2"/>
+                                            </p:txEl>
+                                          </p:spTgt>
+                                        </p:tgtEl>
+                                        <p:attrNameLst>
+                                          <p:attrName>style.visibility</p:attrName>
+                                        </p:attrNameLst>
+                                      </p:cBhvr>
+                                      <p:to>
+                                        <p:strVal val="visible"/>
+                                      </p:to>
+                                    </p:set>
+                                    <p:animEffect transition="in" filter="fade">
+                                      <p:cBhvr>
+                                        <p:cTn id="19" dur="1000"/>
+                                        <p:tgtEl>
+                                          <p:spTgt spid="3">
+                                            <p:txEl>
+                                              <p:pRg st="2" end="2"/>
+                                            </p:txEl>
+                                          </p:spTgt>
+                                        </p:tgtEl>
+                                      </p:cBhvr>
+                                    </p:animEffect>
+                                    <p:anim calcmode="lin" valueType="num">
+                                      <p:cBhvr>
+                                        <p:cTn id="20" dur="1000" fill="hold"/>
+                                        <p:tgtEl>
+                                          <p:spTgt spid="3">
+                                            <p:txEl>
+                                              <p:pRg st="2" end="2"/>
+                                            </p:txEl>
+                                          </p:spTgt>
+                                        </p:tgtEl>
+                                        <p:attrNameLst>
+                                          <p:attrName>ppt_x</p:attrName>
+                                        </p:attrNameLst>
+                                      </p:cBhvr>
+                                      <p:tavLst>
+                                        <p:tav tm="0">
+                                          <p:val>
+                                            <p:strVal val="#ppt_x"/>
+                                          </p:val>
+                                        </p:tav>
+                                        <p:tav tm="100000">
+                                          <p:val>
+                                            <p:strVal val="#ppt_x"/>
+                                          </p:val>
+                                        </p:tav>
+                                      </p:tavLst>
+                                    </p:anim>
+                                    <p:anim calcmode="lin" valueType="num">
+                                      <p:cBhvr>
+                                        <p:cTn id="21" dur="1000" fill="hold"/>
+                                        <p:tgtEl>
+                                          <p:spTgt spid="3">
+                                            <p:txEl>
+                                              <p:pRg st="2" end="2"/>
+                                            </p:txEl>
+                                          </p:spTgt>
+                                        </p:tgtEl>
+                                        <p:attrNameLst>
+                                          <p:attrName>ppt_y</p:attrName>
+                                        </p:attrNameLst>
+                                      </p:cBhvr>
+                                      <p:tavLst>
+                                        <p:tav tm="0">
+                                          <p:val>
+                                            <p:strVal val="#ppt_y+.1"/>
+                                          </p:val>
+                                        </p:tav>
+                                        <p:tav tm="100000">
+                                          <p:val>
+                                            <p:strVal val="#ppt_y"/>
+                                          </p:val>
+                                        </p:tav>
+                                      </p:tavLst>
+                                    </p:anim>
+                                  </p:childTnLst>
+                                </p:cTn>
+                              </p:par>
+                              <p:par>
+                                <p:cTn id="22" presetID="42" presetClass="entr" presetSubtype="0" fill="hold" grpId="0" nodeType="withEffect">
+                                  <p:stCondLst>
+                                    <p:cond delay="0"/>
+                                  </p:stCondLst>
+                                  <p:childTnLst>
+                                    <p:set>
+                                      <p:cBhvr>
+                                        <p:cTn id="23" dur="1" fill="hold">
+                                          <p:stCondLst>
+                                            <p:cond delay="0"/>
+                                          </p:stCondLst>
+                                        </p:cTn>
+                                        <p:tgtEl>
+                                          <p:spTgt spid="3">
+                                            <p:txEl>
+                                              <p:pRg st="3" end="3"/>
+                                            </p:txEl>
+                                          </p:spTgt>
+                                        </p:tgtEl>
+                                        <p:attrNameLst>
+                                          <p:attrName>style.visibility</p:attrName>
+                                        </p:attrNameLst>
+                                      </p:cBhvr>
+                                      <p:to>
+                                        <p:strVal val="visible"/>
+                                      </p:to>
+                                    </p:set>
+                                    <p:animEffect transition="in" filter="fade">
+                                      <p:cBhvr>
+                                        <p:cTn id="24" dur="1000"/>
+                                        <p:tgtEl>
+                                          <p:spTgt spid="3">
+                                            <p:txEl>
+                                              <p:pRg st="3" end="3"/>
+                                            </p:txEl>
+                                          </p:spTgt>
+                                        </p:tgtEl>
+                                      </p:cBhvr>
+                                    </p:animEffect>
+                                    <p:anim calcmode="lin" valueType="num">
+                                      <p:cBhvr>
+                                        <p:cTn id="25" dur="1000" fill="hold"/>
+                                        <p:tgtEl>
+                                          <p:spTgt spid="3">
+                                            <p:txEl>
+                                              <p:pRg st="3" end="3"/>
+                                            </p:txEl>
+                                          </p:spTgt>
+                                        </p:tgtEl>
+                                        <p:attrNameLst>
+                                          <p:attrName>ppt_x</p:attrName>
+                                        </p:attrNameLst>
+                                      </p:cBhvr>
+                                      <p:tavLst>
+                                        <p:tav tm="0">
+                                          <p:val>
+                                            <p:strVal val="#ppt_x"/>
+                                          </p:val>
+                                        </p:tav>
+                                        <p:tav tm="100000">
+                                          <p:val>
+                                            <p:strVal val="#ppt_x"/>
+                                          </p:val>
+                                        </p:tav>
+                                      </p:tavLst>
+                                    </p:anim>
+                                    <p:anim calcmode="lin" valueType="num">
+                                      <p:cBhvr>
+                                        <p:cTn id="26" dur="1000" fill="hold"/>
+                                        <p:tgtEl>
+                                          <p:spTgt spid="3">
+                                            <p:txEl>
+                                              <p:pRg st="3" end="3"/>
+                                            </p:txEl>
+                                          </p:spTgt>
+                                        </p:tgtEl>
+                                        <p:attrNameLst>
+                                          <p:attrName>ppt_y</p:attrName>
+                                        </p:attrNameLst>
+                                      </p:cBhvr>
+                                      <p:tavLst>
+                                        <p:tav tm="0">
+                                          <p:val>
+                                            <p:strVal val="#ppt_y+.1"/>
+                                          </p:val>
+                                        </p:tav>
+                                        <p:tav tm="100000">
+                                          <p:val>
+                                            <p:strVal val="#ppt_y"/>
+                                          </p:val>
+                                        </p:tav>
+                                      </p:tavLst>
+                                    </p:anim>
+                                  </p:childTnLst>
+                                </p:cTn>
+                              </p:par>
+                              <p:par>
+                                <p:cTn id="27" presetID="42" presetClass="entr" presetSubtype="0" fill="hold" grpId="0" nodeType="withEffect">
+                                  <p:stCondLst>
+                                    <p:cond delay="0"/>
+                                  </p:stCondLst>
+                                  <p:childTnLst>
+                                    <p:set>
+                                      <p:cBhvr>
+                                        <p:cTn id="28" dur="1" fill="hold">
+                                          <p:stCondLst>
+                                            <p:cond delay="0"/>
+                                          </p:stCondLst>
+                                        </p:cTn>
+                                        <p:tgtEl>
+                                          <p:spTgt spid="3">
+                                            <p:txEl>
+                                              <p:pRg st="4" end="4"/>
+                                            </p:txEl>
+                                          </p:spTgt>
+                                        </p:tgtEl>
+                                        <p:attrNameLst>
+                                          <p:attrName>style.visibility</p:attrName>
+                                        </p:attrNameLst>
+                                      </p:cBhvr>
+                                      <p:to>
+                                        <p:strVal val="visible"/>
+                                      </p:to>
+                                    </p:set>
+                                    <p:animEffect transition="in" filter="fade">
+                                      <p:cBhvr>
+                                        <p:cTn id="29" dur="1000"/>
+                                        <p:tgtEl>
+                                          <p:spTgt spid="3">
+                                            <p:txEl>
+                                              <p:pRg st="4" end="4"/>
+                                            </p:txEl>
+                                          </p:spTgt>
+                                        </p:tgtEl>
+                                      </p:cBhvr>
+                                    </p:animEffect>
+                                    <p:anim calcmode="lin" valueType="num">
+                                      <p:cBhvr>
+                                        <p:cTn id="30" dur="1000" fill="hold"/>
+                                        <p:tgtEl>
+                                          <p:spTgt spid="3">
+                                            <p:txEl>
+                                              <p:pRg st="4" end="4"/>
+                                            </p:txEl>
+                                          </p:spTgt>
+                                        </p:tgtEl>
+                                        <p:attrNameLst>
+                                          <p:attrName>ppt_x</p:attrName>
+                                        </p:attrNameLst>
+                                      </p:cBhvr>
+                                      <p:tavLst>
+                                        <p:tav tm="0">
+                                          <p:val>
+                                            <p:strVal val="#ppt_x"/>
+                                          </p:val>
+                                        </p:tav>
+                                        <p:tav tm="100000">
+                                          <p:val>
+                                            <p:strVal val="#ppt_x"/>
+                                          </p:val>
+                                        </p:tav>
+                                      </p:tavLst>
+                                    </p:anim>
+                                    <p:anim calcmode="lin" valueType="num">
+                                      <p:cBhvr>
+                                        <p:cTn id="31" dur="1000" fill="hold"/>
+                                        <p:tgtEl>
+                                          <p:spTgt spid="3">
+                                            <p:txEl>
+                                              <p:pRg st="4" end="4"/>
+                                            </p:txEl>
+                                          </p:spTgt>
+                                        </p:tgtEl>
+                                        <p:attrNameLst>
+                                          <p:attrName>ppt_y</p:attrName>
+                                        </p:attrNameLst>
+                                      </p:cBhvr>
+                                      <p:tavLst>
+                                        <p:tav tm="0">
+                                          <p:val>
+                                            <p:strVal val="#ppt_y+.1"/>
+                                          </p:val>
+                                        </p:tav>
+                                        <p:tav tm="100000">
+                                          <p:val>
+                                            <p:strVal val="#ppt_y"/>
+                                          </p:val>
+                                        </p:tav>
+                                      </p:tavLst>
+                                    </p:anim>
+                                  </p:childTnLst>
+                                </p:cTn>
+                              </p:par>
+                            </p:childTnLst>
+                          </p:cTn>
+                        </p:par>
+                      </p:childTnLst>
+                    </p:cTn>
+                  </p:par>
+                  <p:par>
+                    <p:cTn id="32" fill="hold">
+                      <p:stCondLst>
+                        <p:cond delay="indefinite"/>
+                      </p:stCondLst>
+                      <p:childTnLst>
+                        <p:par>
+                          <p:cTn id="33" fill="hold">
+                            <p:stCondLst>
+                              <p:cond delay="0"/>
+                            </p:stCondLst>
+                            <p:childTnLst>
+                              <p:par>
+                                <p:cTn id="34" presetID="42" presetClass="entr" presetSubtype="0" fill="hold" grpId="0" nodeType="clickEffect">
+                                  <p:stCondLst>
+                                    <p:cond delay="0"/>
+                                  </p:stCondLst>
+                                  <p:childTnLst>
+                                    <p:set>
+                                      <p:cBhvr>
+                                        <p:cTn id="35" dur="1" fill="hold">
+                                          <p:stCondLst>
+                                            <p:cond delay="0"/>
+                                          </p:stCondLst>
+                                        </p:cTn>
+                                        <p:tgtEl>
+                                          <p:spTgt spid="3">
+                                            <p:txEl>
+                                              <p:pRg st="5" end="5"/>
+                                            </p:txEl>
+                                          </p:spTgt>
+                                        </p:tgtEl>
+                                        <p:attrNameLst>
+                                          <p:attrName>style.visibility</p:attrName>
+                                        </p:attrNameLst>
+                                      </p:cBhvr>
+                                      <p:to>
+                                        <p:strVal val="visible"/>
+                                      </p:to>
+                                    </p:set>
+                                    <p:animEffect transition="in" filter="fade">
+                                      <p:cBhvr>
+                                        <p:cTn id="36" dur="1000"/>
+                                        <p:tgtEl>
+                                          <p:spTgt spid="3">
+                                            <p:txEl>
+                                              <p:pRg st="5" end="5"/>
+                                            </p:txEl>
+                                          </p:spTgt>
+                                        </p:tgtEl>
+                                      </p:cBhvr>
+                                    </p:animEffect>
+                                    <p:anim calcmode="lin" valueType="num">
+                                      <p:cBhvr>
+                                        <p:cTn id="37" dur="1000" fill="hold"/>
+                                        <p:tgtEl>
+                                          <p:spTgt spid="3">
+                                            <p:txEl>
+                                              <p:pRg st="5" end="5"/>
+                                            </p:txEl>
+                                          </p:spTgt>
+                                        </p:tgtEl>
+                                        <p:attrNameLst>
+                                          <p:attrName>ppt_x</p:attrName>
+                                        </p:attrNameLst>
+                                      </p:cBhvr>
+                                      <p:tavLst>
+                                        <p:tav tm="0">
+                                          <p:val>
+                                            <p:strVal val="#ppt_x"/>
+                                          </p:val>
+                                        </p:tav>
+                                        <p:tav tm="100000">
+                                          <p:val>
+                                            <p:strVal val="#ppt_x"/>
+                                          </p:val>
+                                        </p:tav>
+                                      </p:tavLst>
+                                    </p:anim>
+                                    <p:anim calcmode="lin" valueType="num">
+                                      <p:cBhvr>
+                                        <p:cTn id="38" dur="1000" fill="hold"/>
+                                        <p:tgtEl>
+                                          <p:spTgt spid="3">
+                                            <p:txEl>
+                                              <p:pRg st="5" end="5"/>
                                             </p:txEl>
                                           </p:spTgt>
                                         </p:tgtEl>

</xml_diff>